<commit_message>
PPT PHP Dev Web 26Maio2022
</commit_message>
<xml_diff>
--- a/01 Classes/Aula 12 e 13 Desenvolvimento Web PHP - PHP.pptx
+++ b/01 Classes/Aula 12 e 13 Desenvolvimento Web PHP - PHP.pptx
@@ -31364,7 +31364,7 @@
               <a:t>-&gt;</a:t>
             </a:r>
             <a:r>
-              <a:rPr lang="en-US" sz="2000" dirty="0" err="1">
+              <a:rPr lang="en-US" sz="2000" b="1" dirty="0" err="1">
                 <a:solidFill>
                   <a:schemeClr val="tx1"/>
                 </a:solidFill>
@@ -38215,8 +38215,25 @@
                 <a:latin typeface="Times New Roman" panose="02020603050405020304" pitchFamily="18" charset="0"/>
                 <a:cs typeface="Times New Roman" panose="02020603050405020304" pitchFamily="18" charset="0"/>
               </a:rPr>
-              <a:t>['NAME']}&lt;/p&gt;";</a:t>
-            </a:r>
+              <a:t>['NAME']}&lt;/</a:t>
+            </a:r>
+            <a:r>
+              <a:rPr lang="pt-BR" sz="2000">
+                <a:solidFill>
+                  <a:schemeClr val="tx1"/>
+                </a:solidFill>
+                <a:latin typeface="Times New Roman" panose="02020603050405020304" pitchFamily="18" charset="0"/>
+                <a:cs typeface="Times New Roman" panose="02020603050405020304" pitchFamily="18" charset="0"/>
+              </a:rPr>
+              <a:t>p&gt;"; }</a:t>
+            </a:r>
+            <a:endParaRPr lang="pt-BR" sz="2000" dirty="0">
+              <a:solidFill>
+                <a:schemeClr val="tx1"/>
+              </a:solidFill>
+              <a:latin typeface="Times New Roman" panose="02020603050405020304" pitchFamily="18" charset="0"/>
+              <a:cs typeface="Times New Roman" panose="02020603050405020304" pitchFamily="18" charset="0"/>
+            </a:endParaRPr>
           </a:p>
           <a:p>
             <a:pPr marL="0" indent="0" algn="just">
@@ -38833,7 +38850,37 @@
                 <a:latin typeface="Times New Roman" panose="02020603050405020304" pitchFamily="18" charset="0"/>
                 <a:cs typeface="Times New Roman" panose="02020603050405020304" pitchFamily="18" charset="0"/>
               </a:rPr>
-              <a:t> department (NAME) </a:t>
+              <a:t> </a:t>
+            </a:r>
+            <a:r>
+              <a:rPr lang="en-US" sz="1800" b="1" dirty="0" err="1">
+                <a:solidFill>
+                  <a:srgbClr val="FF0000"/>
+                </a:solidFill>
+                <a:latin typeface="Times New Roman" panose="02020603050405020304" pitchFamily="18" charset="0"/>
+                <a:cs typeface="Times New Roman" panose="02020603050405020304" pitchFamily="18" charset="0"/>
+              </a:rPr>
+              <a:t>DBNAME.</a:t>
+            </a:r>
+            <a:r>
+              <a:rPr lang="en-US" sz="1800" dirty="0" err="1">
+                <a:solidFill>
+                  <a:schemeClr val="tx1"/>
+                </a:solidFill>
+                <a:latin typeface="Times New Roman" panose="02020603050405020304" pitchFamily="18" charset="0"/>
+                <a:cs typeface="Times New Roman" panose="02020603050405020304" pitchFamily="18" charset="0"/>
+              </a:rPr>
+              <a:t>department</a:t>
+            </a:r>
+            <a:r>
+              <a:rPr lang="en-US" sz="1800" dirty="0">
+                <a:solidFill>
+                  <a:schemeClr val="tx1"/>
+                </a:solidFill>
+                <a:latin typeface="Times New Roman" panose="02020603050405020304" pitchFamily="18" charset="0"/>
+                <a:cs typeface="Times New Roman" panose="02020603050405020304" pitchFamily="18" charset="0"/>
+              </a:rPr>
+              <a:t> (NAME) </a:t>
             </a:r>
             <a:r>
               <a:rPr lang="en-US" sz="1800" b="1" dirty="0">

</xml_diff>

<commit_message>
PPT PHP Dev Web 27Maio2022 MVCs
</commit_message>
<xml_diff>
--- a/01 Classes/Aula 12 e 13 Desenvolvimento Web PHP - PHP.pptx
+++ b/01 Classes/Aula 12 e 13 Desenvolvimento Web PHP - PHP.pptx
@@ -5,7 +5,7 @@
     <p:sldMasterId id="2147483648" r:id="rId1"/>
   </p:sldMasterIdLst>
   <p:notesMasterIdLst>
-    <p:notesMasterId r:id="rId77"/>
+    <p:notesMasterId r:id="rId78"/>
   </p:notesMasterIdLst>
   <p:sldIdLst>
     <p:sldId id="256" r:id="rId2"/>
@@ -77,12 +77,13 @@
     <p:sldId id="454" r:id="rId68"/>
     <p:sldId id="456" r:id="rId69"/>
     <p:sldId id="455" r:id="rId70"/>
-    <p:sldId id="333" r:id="rId71"/>
-    <p:sldId id="459" r:id="rId72"/>
-    <p:sldId id="323" r:id="rId73"/>
-    <p:sldId id="334" r:id="rId74"/>
-    <p:sldId id="337" r:id="rId75"/>
-    <p:sldId id="309" r:id="rId76"/>
+    <p:sldId id="466" r:id="rId71"/>
+    <p:sldId id="333" r:id="rId72"/>
+    <p:sldId id="459" r:id="rId73"/>
+    <p:sldId id="323" r:id="rId74"/>
+    <p:sldId id="334" r:id="rId75"/>
+    <p:sldId id="337" r:id="rId76"/>
+    <p:sldId id="309" r:id="rId77"/>
   </p:sldIdLst>
   <p:sldSz cx="9144000" cy="5143500" type="screen16x9"/>
   <p:notesSz cx="6858000" cy="9144000"/>
@@ -4848,7 +4849,7 @@
     </p:spTree>
     <p:extLst>
       <p:ext uri="{BB962C8B-B14F-4D97-AF65-F5344CB8AC3E}">
-        <p14:creationId xmlns:p14="http://schemas.microsoft.com/office/powerpoint/2010/main" val="585304384"/>
+        <p14:creationId xmlns:p14="http://schemas.microsoft.com/office/powerpoint/2010/main" val="3021117740"/>
       </p:ext>
     </p:extLst>
   </p:cSld>
@@ -4914,7 +4915,7 @@
     </p:spTree>
     <p:extLst>
       <p:ext uri="{BB962C8B-B14F-4D97-AF65-F5344CB8AC3E}">
-        <p14:creationId xmlns:p14="http://schemas.microsoft.com/office/powerpoint/2010/main" val="654888718"/>
+        <p14:creationId xmlns:p14="http://schemas.microsoft.com/office/powerpoint/2010/main" val="585304384"/>
       </p:ext>
     </p:extLst>
   </p:cSld>
@@ -5046,7 +5047,7 @@
     </p:spTree>
     <p:extLst>
       <p:ext uri="{BB962C8B-B14F-4D97-AF65-F5344CB8AC3E}">
-        <p14:creationId xmlns:p14="http://schemas.microsoft.com/office/powerpoint/2010/main" val="2709569597"/>
+        <p14:creationId xmlns:p14="http://schemas.microsoft.com/office/powerpoint/2010/main" val="654888718"/>
       </p:ext>
     </p:extLst>
   </p:cSld>
@@ -5112,6 +5113,72 @@
     </p:spTree>
     <p:extLst>
       <p:ext uri="{BB962C8B-B14F-4D97-AF65-F5344CB8AC3E}">
+        <p14:creationId xmlns:p14="http://schemas.microsoft.com/office/powerpoint/2010/main" val="2709569597"/>
+      </p:ext>
+    </p:extLst>
+  </p:cSld>
+  <p:clrMapOvr>
+    <a:masterClrMapping/>
+  </p:clrMapOvr>
+</p:notes>
+</file>
+
+<file path=ppt/notesSlides/notesSlide72.xml><?xml version="1.0" encoding="utf-8"?>
+<p:notes xmlns:a="http://schemas.openxmlformats.org/drawingml/2006/main" xmlns:r="http://schemas.openxmlformats.org/officeDocument/2006/relationships" xmlns:p="http://schemas.openxmlformats.org/presentationml/2006/main">
+  <p:cSld>
+    <p:spTree>
+      <p:nvGrpSpPr>
+        <p:cNvPr id="1" name=""/>
+        <p:cNvGrpSpPr/>
+        <p:nvPr/>
+      </p:nvGrpSpPr>
+      <p:grpSpPr>
+        <a:xfrm>
+          <a:off x="0" y="0"/>
+          <a:ext cx="0" cy="0"/>
+          <a:chOff x="0" y="0"/>
+          <a:chExt cx="0" cy="0"/>
+        </a:xfrm>
+      </p:grpSpPr>
+      <p:sp>
+        <p:nvSpPr>
+          <p:cNvPr id="2" name="Espaço Reservado para Imagem de Slide 1"/>
+          <p:cNvSpPr>
+            <a:spLocks noGrp="1" noRot="1" noChangeAspect="1"/>
+          </p:cNvSpPr>
+          <p:nvPr>
+            <p:ph type="sldImg"/>
+          </p:nvPr>
+        </p:nvSpPr>
+        <p:spPr>
+          <a:xfrm>
+            <a:off x="381000" y="685800"/>
+            <a:ext cx="6096000" cy="3429000"/>
+          </a:xfrm>
+        </p:spPr>
+      </p:sp>
+      <p:sp>
+        <p:nvSpPr>
+          <p:cNvPr id="3" name="Espaço Reservado para Anotações 2"/>
+          <p:cNvSpPr>
+            <a:spLocks noGrp="1"/>
+          </p:cNvSpPr>
+          <p:nvPr>
+            <p:ph type="body" idx="1"/>
+          </p:nvPr>
+        </p:nvSpPr>
+        <p:spPr/>
+        <p:txBody>
+          <a:bodyPr/>
+          <a:lstStyle/>
+          <a:p>
+            <a:endParaRPr lang="pt-BR" dirty="0"/>
+          </a:p>
+        </p:txBody>
+      </p:sp>
+    </p:spTree>
+    <p:extLst>
+      <p:ext uri="{BB962C8B-B14F-4D97-AF65-F5344CB8AC3E}">
         <p14:creationId xmlns:p14="http://schemas.microsoft.com/office/powerpoint/2010/main" val="2296249050"/>
       </p:ext>
     </p:extLst>
@@ -5122,7 +5189,7 @@
 </p:notes>
 </file>
 
-<file path=ppt/notesSlides/notesSlide72.xml><?xml version="1.0" encoding="utf-8"?>
+<file path=ppt/notesSlides/notesSlide73.xml><?xml version="1.0" encoding="utf-8"?>
 <p:notes xmlns:a="http://schemas.openxmlformats.org/drawingml/2006/main" xmlns:r="http://schemas.openxmlformats.org/officeDocument/2006/relationships" xmlns:p="http://schemas.openxmlformats.org/presentationml/2006/main">
   <p:cSld>
     <p:spTree>
@@ -35870,6 +35937,234 @@
               <a:cs typeface="Times New Roman" panose="02020603050405020304" pitchFamily="18" charset="0"/>
             </a:endParaRPr>
           </a:p>
+          <a:p>
+            <a:pPr marL="0" indent="0" algn="just">
+              <a:buNone/>
+            </a:pPr>
+            <a:endParaRPr lang="pt-BR" sz="2400" dirty="0">
+              <a:solidFill>
+                <a:schemeClr val="tx1"/>
+              </a:solidFill>
+              <a:latin typeface="Times New Roman" panose="02020603050405020304" pitchFamily="18" charset="0"/>
+              <a:cs typeface="Times New Roman" panose="02020603050405020304" pitchFamily="18" charset="0"/>
+            </a:endParaRPr>
+          </a:p>
+          <a:p>
+            <a:pPr marL="0" indent="0" algn="just">
+              <a:buNone/>
+            </a:pPr>
+            <a:endParaRPr lang="pt-BR" sz="2400" dirty="0">
+              <a:solidFill>
+                <a:schemeClr val="tx1"/>
+              </a:solidFill>
+              <a:latin typeface="Times New Roman" panose="02020603050405020304" pitchFamily="18" charset="0"/>
+              <a:cs typeface="Times New Roman" panose="02020603050405020304" pitchFamily="18" charset="0"/>
+            </a:endParaRPr>
+          </a:p>
+          <a:p>
+            <a:pPr marL="0" indent="0" algn="just">
+              <a:buNone/>
+            </a:pPr>
+            <a:endParaRPr lang="pt-BR" sz="2400" dirty="0">
+              <a:solidFill>
+                <a:schemeClr val="tx1"/>
+              </a:solidFill>
+              <a:latin typeface="Times New Roman" panose="02020603050405020304" pitchFamily="18" charset="0"/>
+              <a:cs typeface="Times New Roman" panose="02020603050405020304" pitchFamily="18" charset="0"/>
+            </a:endParaRPr>
+          </a:p>
+          <a:p>
+            <a:pPr marL="0" indent="0" algn="just">
+              <a:buNone/>
+            </a:pPr>
+            <a:endParaRPr lang="pt-BR" sz="2400" dirty="0">
+              <a:solidFill>
+                <a:schemeClr val="tx1"/>
+              </a:solidFill>
+              <a:latin typeface="Times New Roman" panose="02020603050405020304" pitchFamily="18" charset="0"/>
+              <a:cs typeface="Times New Roman" panose="02020603050405020304" pitchFamily="18" charset="0"/>
+            </a:endParaRPr>
+          </a:p>
+          <a:p>
+            <a:pPr marL="0" indent="0" algn="just">
+              <a:buNone/>
+            </a:pPr>
+            <a:endParaRPr lang="pt-BR" sz="2400" dirty="0">
+              <a:solidFill>
+                <a:schemeClr val="tx1"/>
+              </a:solidFill>
+              <a:latin typeface="Times New Roman" panose="02020603050405020304" pitchFamily="18" charset="0"/>
+              <a:cs typeface="Times New Roman" panose="02020603050405020304" pitchFamily="18" charset="0"/>
+            </a:endParaRPr>
+          </a:p>
+          <a:p>
+            <a:pPr marL="0" indent="0" algn="just">
+              <a:buNone/>
+            </a:pPr>
+            <a:endParaRPr lang="pt-BR" sz="2400" dirty="0">
+              <a:solidFill>
+                <a:schemeClr val="tx1"/>
+              </a:solidFill>
+              <a:latin typeface="Times New Roman" panose="02020603050405020304" pitchFamily="18" charset="0"/>
+              <a:cs typeface="Times New Roman" panose="02020603050405020304" pitchFamily="18" charset="0"/>
+            </a:endParaRPr>
+          </a:p>
+          <a:p>
+            <a:pPr marL="0" indent="0" algn="just">
+              <a:buNone/>
+            </a:pPr>
+            <a:endParaRPr lang="pt-BR" sz="1400" dirty="0">
+              <a:solidFill>
+                <a:schemeClr val="tx1"/>
+              </a:solidFill>
+              <a:latin typeface="Times New Roman" panose="02020603050405020304" pitchFamily="18" charset="0"/>
+              <a:cs typeface="Times New Roman" panose="02020603050405020304" pitchFamily="18" charset="0"/>
+            </a:endParaRPr>
+          </a:p>
+          <a:p>
+            <a:pPr marL="0" indent="0" algn="just">
+              <a:buNone/>
+            </a:pPr>
+            <a:r>
+              <a:rPr lang="pt-BR" sz="1400" dirty="0" err="1">
+                <a:solidFill>
+                  <a:schemeClr val="tx1"/>
+                </a:solidFill>
+                <a:latin typeface="Times New Roman" panose="02020603050405020304" pitchFamily="18" charset="0"/>
+                <a:cs typeface="Times New Roman" panose="02020603050405020304" pitchFamily="18" charset="0"/>
+              </a:rPr>
+              <a:t>Controller</a:t>
+            </a:r>
+            <a:r>
+              <a:rPr lang="pt-BR" sz="1400" dirty="0">
+                <a:solidFill>
+                  <a:schemeClr val="tx1"/>
+                </a:solidFill>
+                <a:latin typeface="Times New Roman" panose="02020603050405020304" pitchFamily="18" charset="0"/>
+                <a:cs typeface="Times New Roman" panose="02020603050405020304" pitchFamily="18" charset="0"/>
+              </a:rPr>
+              <a:t>(</a:t>
+            </a:r>
+            <a:r>
+              <a:rPr lang="pt-BR" sz="1400" b="1" dirty="0">
+                <a:solidFill>
+                  <a:srgbClr val="FF0000"/>
+                </a:solidFill>
+                <a:latin typeface="Times New Roman" panose="02020603050405020304" pitchFamily="18" charset="0"/>
+                <a:cs typeface="Times New Roman" panose="02020603050405020304" pitchFamily="18" charset="0"/>
+              </a:rPr>
+              <a:t>API REST</a:t>
+            </a:r>
+            <a:r>
+              <a:rPr lang="pt-BR" sz="1400" dirty="0">
+                <a:solidFill>
+                  <a:schemeClr val="tx1"/>
+                </a:solidFill>
+                <a:latin typeface="Times New Roman" panose="02020603050405020304" pitchFamily="18" charset="0"/>
+                <a:cs typeface="Times New Roman" panose="02020603050405020304" pitchFamily="18" charset="0"/>
+              </a:rPr>
+              <a:t>); </a:t>
+            </a:r>
+            <a:r>
+              <a:rPr lang="pt-BR" sz="1400" dirty="0" err="1">
+                <a:solidFill>
+                  <a:schemeClr val="tx1"/>
+                </a:solidFill>
+                <a:latin typeface="Times New Roman" panose="02020603050405020304" pitchFamily="18" charset="0"/>
+                <a:cs typeface="Times New Roman" panose="02020603050405020304" pitchFamily="18" charset="0"/>
+              </a:rPr>
+              <a:t>View</a:t>
+            </a:r>
+            <a:r>
+              <a:rPr lang="pt-BR" sz="1400" dirty="0">
+                <a:solidFill>
+                  <a:schemeClr val="tx1"/>
+                </a:solidFill>
+                <a:latin typeface="Times New Roman" panose="02020603050405020304" pitchFamily="18" charset="0"/>
+                <a:cs typeface="Times New Roman" panose="02020603050405020304" pitchFamily="18" charset="0"/>
+              </a:rPr>
+              <a:t>(JSON; </a:t>
+            </a:r>
+            <a:r>
+              <a:rPr lang="pt-BR" sz="1400" dirty="0" err="1">
+                <a:solidFill>
+                  <a:schemeClr val="tx1"/>
+                </a:solidFill>
+                <a:latin typeface="Times New Roman" panose="02020603050405020304" pitchFamily="18" charset="0"/>
+                <a:cs typeface="Times New Roman" panose="02020603050405020304" pitchFamily="18" charset="0"/>
+              </a:rPr>
+              <a:t>schemas</a:t>
+            </a:r>
+            <a:r>
+              <a:rPr lang="pt-BR" sz="1400" dirty="0">
+                <a:solidFill>
+                  <a:schemeClr val="tx1"/>
+                </a:solidFill>
+                <a:latin typeface="Times New Roman" panose="02020603050405020304" pitchFamily="18" charset="0"/>
+                <a:cs typeface="Times New Roman" panose="02020603050405020304" pitchFamily="18" charset="0"/>
+              </a:rPr>
+              <a:t>, XML); Model(entidades, RN, persistência). – </a:t>
+            </a:r>
+            <a:r>
+              <a:rPr lang="pt-BR" sz="1400" b="1" dirty="0" err="1">
+                <a:solidFill>
+                  <a:srgbClr val="FF0000"/>
+                </a:solidFill>
+                <a:latin typeface="Times New Roman" panose="02020603050405020304" pitchFamily="18" charset="0"/>
+                <a:cs typeface="Times New Roman" panose="02020603050405020304" pitchFamily="18" charset="0"/>
+              </a:rPr>
+              <a:t>backend</a:t>
+            </a:r>
+            <a:endParaRPr lang="pt-BR" sz="1400" b="1" dirty="0">
+              <a:solidFill>
+                <a:srgbClr val="FF0000"/>
+              </a:solidFill>
+              <a:latin typeface="Times New Roman" panose="02020603050405020304" pitchFamily="18" charset="0"/>
+              <a:cs typeface="Times New Roman" panose="02020603050405020304" pitchFamily="18" charset="0"/>
+            </a:endParaRPr>
+          </a:p>
+          <a:p>
+            <a:pPr marL="0" indent="0" algn="just">
+              <a:buNone/>
+            </a:pPr>
+            <a:r>
+              <a:rPr lang="pt-BR" sz="1400" b="1" dirty="0">
+                <a:solidFill>
+                  <a:srgbClr val="FF0000"/>
+                </a:solidFill>
+                <a:latin typeface="Times New Roman" panose="02020603050405020304" pitchFamily="18" charset="0"/>
+                <a:cs typeface="Times New Roman" panose="02020603050405020304" pitchFamily="18" charset="0"/>
+              </a:rPr>
+              <a:t>Veja</a:t>
+            </a:r>
+            <a:r>
+              <a:rPr lang="pt-BR" sz="1400" dirty="0">
+                <a:solidFill>
+                  <a:schemeClr val="tx1"/>
+                </a:solidFill>
+                <a:latin typeface="Times New Roman" panose="02020603050405020304" pitchFamily="18" charset="0"/>
+                <a:cs typeface="Times New Roman" panose="02020603050405020304" pitchFamily="18" charset="0"/>
+              </a:rPr>
+              <a:t>: </a:t>
+            </a:r>
+            <a:r>
+              <a:rPr lang="pt-BR" sz="1200" dirty="0">
+                <a:solidFill>
+                  <a:schemeClr val="tx1"/>
+                </a:solidFill>
+                <a:latin typeface="Times New Roman" panose="02020603050405020304" pitchFamily="18" charset="0"/>
+                <a:cs typeface="Times New Roman" panose="02020603050405020304" pitchFamily="18" charset="0"/>
+              </a:rPr>
+              <a:t>https://edisciplinas.usp.br/pluginfile.php/4632609/mod_resource/content/1/5%20Arquitetura%20MVC.pdf</a:t>
+            </a:r>
+            <a:endParaRPr lang="pt-BR" sz="1200" b="1" dirty="0">
+              <a:solidFill>
+                <a:srgbClr val="FF0000"/>
+              </a:solidFill>
+              <a:latin typeface="Times New Roman" panose="02020603050405020304" pitchFamily="18" charset="0"/>
+              <a:cs typeface="Times New Roman" panose="02020603050405020304" pitchFamily="18" charset="0"/>
+            </a:endParaRPr>
+          </a:p>
         </p:txBody>
       </p:sp>
       <p:pic>
@@ -43839,12 +44134,20 @@
           <a:lstStyle/>
           <a:p>
             <a:r>
+              <a:rPr lang="en-US" b="1" dirty="0">
+                <a:solidFill>
+                  <a:srgbClr val="0070C0"/>
+                </a:solidFill>
+              </a:rPr>
+              <a:t>PHP – </a:t>
+            </a:r>
+            <a:r>
               <a:rPr lang="en-US" b="1" dirty="0" err="1">
                 <a:solidFill>
                   <a:srgbClr val="0070C0"/>
                 </a:solidFill>
               </a:rPr>
-              <a:t>Leitura</a:t>
+              <a:t>Estrutura</a:t>
             </a:r>
             <a:r>
               <a:rPr lang="en-US" b="1" dirty="0">
@@ -43852,7 +44155,7 @@
                   <a:srgbClr val="0070C0"/>
                 </a:solidFill>
               </a:rPr>
-              <a:t> </a:t>
+              <a:t> de Pastas </a:t>
             </a:r>
             <a:r>
               <a:rPr lang="en-US" b="1" dirty="0" err="1">
@@ -43860,7 +44163,7 @@
                   <a:srgbClr val="0070C0"/>
                 </a:solidFill>
               </a:rPr>
-              <a:t>Específica</a:t>
+              <a:t>Exemplo</a:t>
             </a:r>
             <a:endParaRPr lang="en-US" b="1" dirty="0">
               <a:solidFill>
@@ -43882,8 +44185,8 @@
         </p:nvSpPr>
         <p:spPr>
           <a:xfrm>
-            <a:off x="142865" y="1012261"/>
-            <a:ext cx="8865056" cy="3835312"/>
+            <a:off x="142865" y="1037312"/>
+            <a:ext cx="8865056" cy="3900208"/>
           </a:xfrm>
         </p:spPr>
         <p:txBody>
@@ -43892,117 +44195,852 @@
           </a:bodyPr>
           <a:lstStyle/>
           <a:p>
-            <a:pPr marL="0" indent="0" algn="just">
-              <a:buNone/>
-            </a:pPr>
-            <a:r>
-              <a:rPr lang="pt-BR" sz="2000" dirty="0">
-                <a:latin typeface="Times New Roman" panose="02020603050405020304" pitchFamily="18" charset="0"/>
-                <a:cs typeface="Times New Roman" panose="02020603050405020304" pitchFamily="18" charset="0"/>
-              </a:rPr>
-              <a:t>[1] </a:t>
-            </a:r>
-            <a:r>
-              <a:rPr lang="pt-BR" sz="2000" b="1" dirty="0">
-                <a:latin typeface="Times New Roman" panose="02020603050405020304" pitchFamily="18" charset="0"/>
-                <a:cs typeface="Times New Roman" panose="02020603050405020304" pitchFamily="18" charset="0"/>
-              </a:rPr>
-              <a:t>PHP</a:t>
-            </a:r>
-          </a:p>
-          <a:p>
-            <a:pPr marL="0" indent="0" algn="just">
-              <a:buNone/>
-            </a:pPr>
-            <a:r>
-              <a:rPr lang="pt-BR" sz="2000" b="1" dirty="0">
-                <a:latin typeface="Times New Roman" panose="02020603050405020304" pitchFamily="18" charset="0"/>
-                <a:cs typeface="Times New Roman" panose="02020603050405020304" pitchFamily="18" charset="0"/>
-              </a:rPr>
-              <a:t>	Disponível em</a:t>
-            </a:r>
-            <a:r>
-              <a:rPr lang="pt-BR" sz="2000" dirty="0">
-                <a:latin typeface="Times New Roman" panose="02020603050405020304" pitchFamily="18" charset="0"/>
-                <a:cs typeface="Times New Roman" panose="02020603050405020304" pitchFamily="18" charset="0"/>
-              </a:rPr>
-              <a:t>: </a:t>
-            </a:r>
-            <a:r>
-              <a:rPr lang="pt-BR" sz="2000" dirty="0">
-                <a:latin typeface="Times New Roman" panose="02020603050405020304" pitchFamily="18" charset="0"/>
-                <a:cs typeface="Times New Roman" panose="02020603050405020304" pitchFamily="18" charset="0"/>
-                <a:hlinkClick r:id="rId3"/>
-              </a:rPr>
-              <a:t>https://www.php.net/</a:t>
-            </a:r>
-            <a:endParaRPr lang="pt-BR" sz="2000" dirty="0">
+            <a:pPr algn="just">
+              <a:buAutoNum type="arabicPeriod"/>
+            </a:pPr>
+            <a:r>
+              <a:rPr lang="pt-BR" sz="1400" b="1" dirty="0">
+                <a:solidFill>
+                  <a:srgbClr val="FF0000"/>
+                </a:solidFill>
+                <a:latin typeface="Times New Roman" panose="02020603050405020304" pitchFamily="18" charset="0"/>
+                <a:cs typeface="Times New Roman" panose="02020603050405020304" pitchFamily="18" charset="0"/>
+              </a:rPr>
+              <a:t>MVC</a:t>
+            </a:r>
+            <a:r>
+              <a:rPr lang="pt-BR" sz="1400" dirty="0">
+                <a:solidFill>
+                  <a:schemeClr val="tx1"/>
+                </a:solidFill>
+                <a:latin typeface="Times New Roman" panose="02020603050405020304" pitchFamily="18" charset="0"/>
+                <a:cs typeface="Times New Roman" panose="02020603050405020304" pitchFamily="18" charset="0"/>
+              </a:rPr>
+              <a:t> (.</a:t>
+            </a:r>
+            <a:r>
+              <a:rPr lang="pt-BR" sz="1400" dirty="0" err="1">
+                <a:solidFill>
+                  <a:schemeClr val="tx1"/>
+                </a:solidFill>
+                <a:latin typeface="Times New Roman" panose="02020603050405020304" pitchFamily="18" charset="0"/>
+                <a:cs typeface="Times New Roman" panose="02020603050405020304" pitchFamily="18" charset="0"/>
+              </a:rPr>
+              <a:t>gitigone</a:t>
+            </a:r>
+            <a:r>
+              <a:rPr lang="pt-BR" sz="1400" dirty="0">
+                <a:solidFill>
+                  <a:schemeClr val="tx1"/>
+                </a:solidFill>
+                <a:latin typeface="Times New Roman" panose="02020603050405020304" pitchFamily="18" charset="0"/>
+                <a:cs typeface="Times New Roman" panose="02020603050405020304" pitchFamily="18" charset="0"/>
+              </a:rPr>
+              <a:t>; .</a:t>
+            </a:r>
+            <a:r>
+              <a:rPr lang="pt-BR" sz="1400" dirty="0" err="1">
+                <a:solidFill>
+                  <a:schemeClr val="tx1"/>
+                </a:solidFill>
+                <a:latin typeface="Times New Roman" panose="02020603050405020304" pitchFamily="18" charset="0"/>
+                <a:cs typeface="Times New Roman" panose="02020603050405020304" pitchFamily="18" charset="0"/>
+              </a:rPr>
+              <a:t>htaccess</a:t>
+            </a:r>
+            <a:r>
+              <a:rPr lang="pt-BR" sz="1400" dirty="0">
+                <a:solidFill>
+                  <a:schemeClr val="tx1"/>
+                </a:solidFill>
+                <a:latin typeface="Times New Roman" panose="02020603050405020304" pitchFamily="18" charset="0"/>
+                <a:cs typeface="Times New Roman" panose="02020603050405020304" pitchFamily="18" charset="0"/>
+              </a:rPr>
+              <a:t>; .</a:t>
+            </a:r>
+            <a:r>
+              <a:rPr lang="pt-BR" sz="1400" dirty="0" err="1">
+                <a:solidFill>
+                  <a:schemeClr val="tx1"/>
+                </a:solidFill>
+                <a:latin typeface="Times New Roman" panose="02020603050405020304" pitchFamily="18" charset="0"/>
+                <a:cs typeface="Times New Roman" panose="02020603050405020304" pitchFamily="18" charset="0"/>
+              </a:rPr>
+              <a:t>env</a:t>
+            </a:r>
+            <a:r>
+              <a:rPr lang="pt-BR" sz="1400" dirty="0">
+                <a:solidFill>
+                  <a:schemeClr val="tx1"/>
+                </a:solidFill>
+                <a:latin typeface="Times New Roman" panose="02020603050405020304" pitchFamily="18" charset="0"/>
+                <a:cs typeface="Times New Roman" panose="02020603050405020304" pitchFamily="18" charset="0"/>
+              </a:rPr>
+              <a:t>; .</a:t>
+            </a:r>
+            <a:r>
+              <a:rPr lang="pt-BR" sz="1400" dirty="0" err="1">
+                <a:solidFill>
+                  <a:schemeClr val="tx1"/>
+                </a:solidFill>
+                <a:latin typeface="Times New Roman" panose="02020603050405020304" pitchFamily="18" charset="0"/>
+                <a:cs typeface="Times New Roman" panose="02020603050405020304" pitchFamily="18" charset="0"/>
+              </a:rPr>
+              <a:t>env.example</a:t>
+            </a:r>
+            <a:r>
+              <a:rPr lang="pt-BR" sz="1400" dirty="0">
+                <a:solidFill>
+                  <a:schemeClr val="tx1"/>
+                </a:solidFill>
+                <a:latin typeface="Times New Roman" panose="02020603050405020304" pitchFamily="18" charset="0"/>
+                <a:cs typeface="Times New Roman" panose="02020603050405020304" pitchFamily="18" charset="0"/>
+              </a:rPr>
+              <a:t>; .</a:t>
+            </a:r>
+            <a:r>
+              <a:rPr lang="pt-BR" sz="1400" dirty="0" err="1">
+                <a:solidFill>
+                  <a:schemeClr val="tx1"/>
+                </a:solidFill>
+                <a:latin typeface="Times New Roman" panose="02020603050405020304" pitchFamily="18" charset="0"/>
+                <a:cs typeface="Times New Roman" panose="02020603050405020304" pitchFamily="18" charset="0"/>
+              </a:rPr>
+              <a:t>git</a:t>
+            </a:r>
+            <a:r>
+              <a:rPr lang="pt-BR" sz="1400" dirty="0">
+                <a:solidFill>
+                  <a:schemeClr val="tx1"/>
+                </a:solidFill>
+                <a:latin typeface="Times New Roman" panose="02020603050405020304" pitchFamily="18" charset="0"/>
+                <a:cs typeface="Times New Roman" panose="02020603050405020304" pitchFamily="18" charset="0"/>
+              </a:rPr>
+              <a:t>; </a:t>
+            </a:r>
+            <a:r>
+              <a:rPr lang="pt-BR" sz="1400" dirty="0" err="1">
+                <a:solidFill>
+                  <a:schemeClr val="tx1"/>
+                </a:solidFill>
+                <a:latin typeface="Times New Roman" panose="02020603050405020304" pitchFamily="18" charset="0"/>
+                <a:cs typeface="Times New Roman" panose="02020603050405020304" pitchFamily="18" charset="0"/>
+              </a:rPr>
+              <a:t>composer.json</a:t>
+            </a:r>
+            <a:r>
+              <a:rPr lang="pt-BR" sz="1400" dirty="0">
+                <a:solidFill>
+                  <a:schemeClr val="tx1"/>
+                </a:solidFill>
+                <a:latin typeface="Times New Roman" panose="02020603050405020304" pitchFamily="18" charset="0"/>
+                <a:cs typeface="Times New Roman" panose="02020603050405020304" pitchFamily="18" charset="0"/>
+              </a:rPr>
+              <a:t>; </a:t>
+            </a:r>
+            <a:r>
+              <a:rPr lang="pt-BR" sz="1400" dirty="0" err="1">
+                <a:solidFill>
+                  <a:schemeClr val="tx1"/>
+                </a:solidFill>
+                <a:latin typeface="Times New Roman" panose="02020603050405020304" pitchFamily="18" charset="0"/>
+                <a:cs typeface="Times New Roman" panose="02020603050405020304" pitchFamily="18" charset="0"/>
+              </a:rPr>
+              <a:t>composer.lock</a:t>
+            </a:r>
+            <a:r>
+              <a:rPr lang="pt-BR" sz="1400" dirty="0">
+                <a:solidFill>
+                  <a:schemeClr val="tx1"/>
+                </a:solidFill>
+                <a:latin typeface="Times New Roman" panose="02020603050405020304" pitchFamily="18" charset="0"/>
+                <a:cs typeface="Times New Roman" panose="02020603050405020304" pitchFamily="18" charset="0"/>
+              </a:rPr>
+              <a:t>; </a:t>
+            </a:r>
+            <a:r>
+              <a:rPr lang="pt-BR" sz="1400" dirty="0" err="1">
+                <a:solidFill>
+                  <a:schemeClr val="tx1"/>
+                </a:solidFill>
+                <a:latin typeface="Times New Roman" panose="02020603050405020304" pitchFamily="18" charset="0"/>
+                <a:cs typeface="Times New Roman" panose="02020603050405020304" pitchFamily="18" charset="0"/>
+              </a:rPr>
+              <a:t>database;sql</a:t>
+            </a:r>
+            <a:r>
+              <a:rPr lang="pt-BR" sz="1400" dirty="0">
+                <a:solidFill>
+                  <a:schemeClr val="tx1"/>
+                </a:solidFill>
+                <a:latin typeface="Times New Roman" panose="02020603050405020304" pitchFamily="18" charset="0"/>
+                <a:cs typeface="Times New Roman" panose="02020603050405020304" pitchFamily="18" charset="0"/>
+              </a:rPr>
+              <a:t>; </a:t>
+            </a:r>
+            <a:r>
+              <a:rPr lang="pt-BR" sz="1400" dirty="0" err="1">
+                <a:solidFill>
+                  <a:schemeClr val="tx1"/>
+                </a:solidFill>
+                <a:latin typeface="Times New Roman" panose="02020603050405020304" pitchFamily="18" charset="0"/>
+                <a:cs typeface="Times New Roman" panose="02020603050405020304" pitchFamily="18" charset="0"/>
+              </a:rPr>
+              <a:t>index.php</a:t>
+            </a:r>
+            <a:endParaRPr lang="pt-BR" sz="1400" dirty="0">
+              <a:solidFill>
+                <a:schemeClr val="tx1"/>
+              </a:solidFill>
               <a:latin typeface="Times New Roman" panose="02020603050405020304" pitchFamily="18" charset="0"/>
               <a:cs typeface="Times New Roman" panose="02020603050405020304" pitchFamily="18" charset="0"/>
             </a:endParaRPr>
           </a:p>
           <a:p>
-            <a:pPr marL="0" indent="0" algn="just">
-              <a:buNone/>
-            </a:pPr>
-            <a:endParaRPr lang="pt-BR" sz="2000" dirty="0">
+            <a:pPr lvl="1" algn="just">
+              <a:buAutoNum type="arabicPeriod"/>
+            </a:pPr>
+            <a:r>
+              <a:rPr lang="pt-BR" sz="1400" b="1" dirty="0">
+                <a:solidFill>
+                  <a:schemeClr val="tx1"/>
+                </a:solidFill>
+                <a:latin typeface="Times New Roman" panose="02020603050405020304" pitchFamily="18" charset="0"/>
+                <a:cs typeface="Times New Roman" panose="02020603050405020304" pitchFamily="18" charset="0"/>
+              </a:rPr>
+              <a:t>App</a:t>
+            </a:r>
+          </a:p>
+          <a:p>
+            <a:pPr lvl="2" algn="just">
+              <a:buAutoNum type="arabicPeriod"/>
+            </a:pPr>
+            <a:r>
+              <a:rPr lang="pt-BR" sz="1400" dirty="0" err="1">
+                <a:solidFill>
+                  <a:schemeClr val="tx1"/>
+                </a:solidFill>
+                <a:latin typeface="Times New Roman" panose="02020603050405020304" pitchFamily="18" charset="0"/>
+                <a:cs typeface="Times New Roman" panose="02020603050405020304" pitchFamily="18" charset="0"/>
+              </a:rPr>
+              <a:t>Controller</a:t>
+            </a:r>
+            <a:r>
+              <a:rPr lang="pt-BR" sz="1400" dirty="0">
+                <a:solidFill>
+                  <a:schemeClr val="tx1"/>
+                </a:solidFill>
+                <a:latin typeface="Times New Roman" panose="02020603050405020304" pitchFamily="18" charset="0"/>
+                <a:cs typeface="Times New Roman" panose="02020603050405020304" pitchFamily="18" charset="0"/>
+              </a:rPr>
+              <a:t> (</a:t>
+            </a:r>
+            <a:r>
+              <a:rPr lang="pt-BR" sz="1400" dirty="0" err="1">
+                <a:solidFill>
+                  <a:schemeClr val="tx1"/>
+                </a:solidFill>
+                <a:latin typeface="Times New Roman" panose="02020603050405020304" pitchFamily="18" charset="0"/>
+                <a:cs typeface="Times New Roman" panose="02020603050405020304" pitchFamily="18" charset="0"/>
+              </a:rPr>
+              <a:t>clienteController.php</a:t>
+            </a:r>
+            <a:r>
+              <a:rPr lang="pt-BR" sz="1400" dirty="0">
+                <a:solidFill>
+                  <a:schemeClr val="tx1"/>
+                </a:solidFill>
+                <a:latin typeface="Times New Roman" panose="02020603050405020304" pitchFamily="18" charset="0"/>
+                <a:cs typeface="Times New Roman" panose="02020603050405020304" pitchFamily="18" charset="0"/>
+              </a:rPr>
+              <a:t>, </a:t>
+            </a:r>
+            <a:r>
+              <a:rPr lang="pt-BR" sz="1400" dirty="0" err="1">
+                <a:solidFill>
+                  <a:schemeClr val="tx1"/>
+                </a:solidFill>
+                <a:latin typeface="Times New Roman" panose="02020603050405020304" pitchFamily="18" charset="0"/>
+                <a:cs typeface="Times New Roman" panose="02020603050405020304" pitchFamily="18" charset="0"/>
+              </a:rPr>
+              <a:t>fornecedorConttroller.php</a:t>
+            </a:r>
+            <a:r>
+              <a:rPr lang="pt-BR" sz="1400" dirty="0">
+                <a:solidFill>
+                  <a:schemeClr val="tx1"/>
+                </a:solidFill>
+                <a:latin typeface="Times New Roman" panose="02020603050405020304" pitchFamily="18" charset="0"/>
+                <a:cs typeface="Times New Roman" panose="02020603050405020304" pitchFamily="18" charset="0"/>
+              </a:rPr>
+              <a:t>, </a:t>
+            </a:r>
+            <a:r>
+              <a:rPr lang="pt-BR" sz="1400" dirty="0" err="1">
+                <a:solidFill>
+                  <a:schemeClr val="tx1"/>
+                </a:solidFill>
+                <a:latin typeface="Times New Roman" panose="02020603050405020304" pitchFamily="18" charset="0"/>
+                <a:cs typeface="Times New Roman" panose="02020603050405020304" pitchFamily="18" charset="0"/>
+              </a:rPr>
+              <a:t>etc</a:t>
+            </a:r>
+            <a:r>
+              <a:rPr lang="pt-BR" sz="1400" dirty="0">
+                <a:solidFill>
+                  <a:schemeClr val="tx1"/>
+                </a:solidFill>
+                <a:latin typeface="Times New Roman" panose="02020603050405020304" pitchFamily="18" charset="0"/>
+                <a:cs typeface="Times New Roman" panose="02020603050405020304" pitchFamily="18" charset="0"/>
+              </a:rPr>
+              <a:t>) (</a:t>
+            </a:r>
+            <a:r>
+              <a:rPr lang="pt-BR" sz="1400" b="1" dirty="0">
+                <a:solidFill>
+                  <a:schemeClr val="tx1"/>
+                </a:solidFill>
+                <a:latin typeface="Times New Roman" panose="02020603050405020304" pitchFamily="18" charset="0"/>
+                <a:cs typeface="Times New Roman" panose="02020603050405020304" pitchFamily="18" charset="0"/>
+              </a:rPr>
+              <a:t>gerenciador M/V</a:t>
+            </a:r>
+            <a:r>
+              <a:rPr lang="pt-BR" sz="1400" dirty="0">
+                <a:solidFill>
+                  <a:schemeClr val="tx1"/>
+                </a:solidFill>
+                <a:latin typeface="Times New Roman" panose="02020603050405020304" pitchFamily="18" charset="0"/>
+                <a:cs typeface="Times New Roman" panose="02020603050405020304" pitchFamily="18" charset="0"/>
+              </a:rPr>
+              <a:t>) </a:t>
+            </a:r>
+            <a:r>
+              <a:rPr lang="pt-BR" sz="1400" b="1" dirty="0">
+                <a:solidFill>
+                  <a:srgbClr val="FF0000"/>
+                </a:solidFill>
+                <a:latin typeface="Times New Roman" panose="02020603050405020304" pitchFamily="18" charset="0"/>
+                <a:cs typeface="Times New Roman" panose="02020603050405020304" pitchFamily="18" charset="0"/>
+              </a:rPr>
+              <a:t>API REST</a:t>
+            </a:r>
+          </a:p>
+          <a:p>
+            <a:pPr lvl="2" algn="just">
+              <a:buAutoNum type="arabicPeriod"/>
+            </a:pPr>
+            <a:r>
+              <a:rPr lang="pt-BR" sz="1400" dirty="0">
+                <a:solidFill>
+                  <a:schemeClr val="tx1"/>
+                </a:solidFill>
+                <a:latin typeface="Times New Roman" panose="02020603050405020304" pitchFamily="18" charset="0"/>
+                <a:cs typeface="Times New Roman" panose="02020603050405020304" pitchFamily="18" charset="0"/>
+              </a:rPr>
+              <a:t>Model (</a:t>
+            </a:r>
+            <a:r>
+              <a:rPr lang="pt-BR" sz="1400" dirty="0" err="1">
+                <a:solidFill>
+                  <a:schemeClr val="tx1"/>
+                </a:solidFill>
+                <a:latin typeface="Times New Roman" panose="02020603050405020304" pitchFamily="18" charset="0"/>
+                <a:cs typeface="Times New Roman" panose="02020603050405020304" pitchFamily="18" charset="0"/>
+              </a:rPr>
+              <a:t>clienteModel.php</a:t>
+            </a:r>
+            <a:r>
+              <a:rPr lang="pt-BR" sz="1400" dirty="0">
+                <a:solidFill>
+                  <a:schemeClr val="tx1"/>
+                </a:solidFill>
+                <a:latin typeface="Times New Roman" panose="02020603050405020304" pitchFamily="18" charset="0"/>
+                <a:cs typeface="Times New Roman" panose="02020603050405020304" pitchFamily="18" charset="0"/>
+              </a:rPr>
+              <a:t>, </a:t>
+            </a:r>
+            <a:r>
+              <a:rPr lang="pt-BR" sz="1400" dirty="0" err="1">
+                <a:solidFill>
+                  <a:schemeClr val="tx1"/>
+                </a:solidFill>
+                <a:latin typeface="Times New Roman" panose="02020603050405020304" pitchFamily="18" charset="0"/>
+                <a:cs typeface="Times New Roman" panose="02020603050405020304" pitchFamily="18" charset="0"/>
+              </a:rPr>
+              <a:t>fornecedorModel.php</a:t>
+            </a:r>
+            <a:r>
+              <a:rPr lang="pt-BR" sz="1400" dirty="0">
+                <a:solidFill>
+                  <a:schemeClr val="tx1"/>
+                </a:solidFill>
+                <a:latin typeface="Times New Roman" panose="02020603050405020304" pitchFamily="18" charset="0"/>
+                <a:cs typeface="Times New Roman" panose="02020603050405020304" pitchFamily="18" charset="0"/>
+              </a:rPr>
+              <a:t>, </a:t>
+            </a:r>
+            <a:r>
+              <a:rPr lang="pt-BR" sz="1400" dirty="0" err="1">
+                <a:solidFill>
+                  <a:schemeClr val="tx1"/>
+                </a:solidFill>
+                <a:latin typeface="Times New Roman" panose="02020603050405020304" pitchFamily="18" charset="0"/>
+                <a:cs typeface="Times New Roman" panose="02020603050405020304" pitchFamily="18" charset="0"/>
+              </a:rPr>
+              <a:t>etc</a:t>
+            </a:r>
+            <a:r>
+              <a:rPr lang="pt-BR" sz="1400" dirty="0">
+                <a:solidFill>
+                  <a:schemeClr val="tx1"/>
+                </a:solidFill>
+                <a:latin typeface="Times New Roman" panose="02020603050405020304" pitchFamily="18" charset="0"/>
+                <a:cs typeface="Times New Roman" panose="02020603050405020304" pitchFamily="18" charset="0"/>
+              </a:rPr>
+              <a:t>) (</a:t>
+            </a:r>
+            <a:r>
+              <a:rPr lang="pt-BR" sz="1400" b="1" dirty="0">
+                <a:solidFill>
+                  <a:schemeClr val="tx1"/>
+                </a:solidFill>
+                <a:latin typeface="Times New Roman" panose="02020603050405020304" pitchFamily="18" charset="0"/>
+                <a:cs typeface="Times New Roman" panose="02020603050405020304" pitchFamily="18" charset="0"/>
+              </a:rPr>
+              <a:t>DAO, </a:t>
+            </a:r>
+            <a:r>
+              <a:rPr lang="pt-BR" sz="1400" b="1" dirty="0" err="1">
+                <a:solidFill>
+                  <a:schemeClr val="tx1"/>
+                </a:solidFill>
+                <a:latin typeface="Times New Roman" panose="02020603050405020304" pitchFamily="18" charset="0"/>
+                <a:cs typeface="Times New Roman" panose="02020603050405020304" pitchFamily="18" charset="0"/>
+              </a:rPr>
+              <a:t>class</a:t>
+            </a:r>
+            <a:r>
+              <a:rPr lang="pt-BR" sz="1400" b="1" dirty="0">
+                <a:solidFill>
+                  <a:schemeClr val="tx1"/>
+                </a:solidFill>
+                <a:latin typeface="Times New Roman" panose="02020603050405020304" pitchFamily="18" charset="0"/>
+                <a:cs typeface="Times New Roman" panose="02020603050405020304" pitchFamily="18" charset="0"/>
+              </a:rPr>
+              <a:t>, regras de negócio, persistência, </a:t>
+            </a:r>
+            <a:r>
+              <a:rPr lang="pt-BR" sz="1400" b="1" dirty="0" err="1">
+                <a:solidFill>
+                  <a:schemeClr val="tx1"/>
+                </a:solidFill>
+                <a:latin typeface="Times New Roman" panose="02020603050405020304" pitchFamily="18" charset="0"/>
+                <a:cs typeface="Times New Roman" panose="02020603050405020304" pitchFamily="18" charset="0"/>
+              </a:rPr>
+              <a:t>etc</a:t>
+            </a:r>
+            <a:r>
+              <a:rPr lang="pt-BR" sz="1400" dirty="0">
+                <a:solidFill>
+                  <a:schemeClr val="tx1"/>
+                </a:solidFill>
+                <a:latin typeface="Times New Roman" panose="02020603050405020304" pitchFamily="18" charset="0"/>
+                <a:cs typeface="Times New Roman" panose="02020603050405020304" pitchFamily="18" charset="0"/>
+              </a:rPr>
+              <a:t>)</a:t>
+            </a:r>
+          </a:p>
+          <a:p>
+            <a:pPr lvl="2" algn="just">
+              <a:buAutoNum type="arabicPeriod"/>
+            </a:pPr>
+            <a:r>
+              <a:rPr lang="pt-BR" sz="1400" dirty="0" err="1">
+                <a:solidFill>
+                  <a:schemeClr val="tx1"/>
+                </a:solidFill>
+                <a:latin typeface="Times New Roman" panose="02020603050405020304" pitchFamily="18" charset="0"/>
+                <a:cs typeface="Times New Roman" panose="02020603050405020304" pitchFamily="18" charset="0"/>
+              </a:rPr>
+              <a:t>Session</a:t>
+            </a:r>
+            <a:r>
+              <a:rPr lang="pt-BR" sz="1400" dirty="0">
+                <a:solidFill>
+                  <a:schemeClr val="tx1"/>
+                </a:solidFill>
+                <a:latin typeface="Times New Roman" panose="02020603050405020304" pitchFamily="18" charset="0"/>
+                <a:cs typeface="Times New Roman" panose="02020603050405020304" pitchFamily="18" charset="0"/>
+              </a:rPr>
+              <a:t> (</a:t>
+            </a:r>
+            <a:r>
+              <a:rPr lang="pt-BR" sz="1400" b="1" dirty="0">
+                <a:solidFill>
+                  <a:schemeClr val="tx1"/>
+                </a:solidFill>
+                <a:latin typeface="Times New Roman" panose="02020603050405020304" pitchFamily="18" charset="0"/>
+                <a:cs typeface="Times New Roman" panose="02020603050405020304" pitchFamily="18" charset="0"/>
+              </a:rPr>
+              <a:t>controle de sessão</a:t>
+            </a:r>
+            <a:r>
+              <a:rPr lang="pt-BR" sz="1400" dirty="0">
+                <a:solidFill>
+                  <a:schemeClr val="tx1"/>
+                </a:solidFill>
+                <a:latin typeface="Times New Roman" panose="02020603050405020304" pitchFamily="18" charset="0"/>
+                <a:cs typeface="Times New Roman" panose="02020603050405020304" pitchFamily="18" charset="0"/>
+              </a:rPr>
+              <a:t>)</a:t>
+            </a:r>
+          </a:p>
+          <a:p>
+            <a:pPr lvl="2" algn="just">
+              <a:buAutoNum type="arabicPeriod"/>
+            </a:pPr>
+            <a:r>
+              <a:rPr lang="pt-BR" sz="1400" dirty="0" err="1">
+                <a:solidFill>
+                  <a:schemeClr val="tx1"/>
+                </a:solidFill>
+                <a:latin typeface="Times New Roman" panose="02020603050405020304" pitchFamily="18" charset="0"/>
+                <a:cs typeface="Times New Roman" panose="02020603050405020304" pitchFamily="18" charset="0"/>
+              </a:rPr>
+              <a:t>Utils</a:t>
+            </a:r>
+            <a:r>
+              <a:rPr lang="pt-BR" sz="1400" dirty="0">
+                <a:solidFill>
+                  <a:schemeClr val="tx1"/>
+                </a:solidFill>
+                <a:latin typeface="Times New Roman" panose="02020603050405020304" pitchFamily="18" charset="0"/>
+                <a:cs typeface="Times New Roman" panose="02020603050405020304" pitchFamily="18" charset="0"/>
+              </a:rPr>
+              <a:t> (</a:t>
+            </a:r>
+            <a:r>
+              <a:rPr lang="pt-BR" sz="1400" b="1" dirty="0" err="1">
+                <a:solidFill>
+                  <a:schemeClr val="tx1"/>
+                </a:solidFill>
+                <a:latin typeface="Times New Roman" panose="02020603050405020304" pitchFamily="18" charset="0"/>
+                <a:cs typeface="Times New Roman" panose="02020603050405020304" pitchFamily="18" charset="0"/>
+              </a:rPr>
+              <a:t>funtions</a:t>
+            </a:r>
+            <a:r>
+              <a:rPr lang="pt-BR" sz="1400" dirty="0">
+                <a:solidFill>
+                  <a:schemeClr val="tx1"/>
+                </a:solidFill>
+                <a:latin typeface="Times New Roman" panose="02020603050405020304" pitchFamily="18" charset="0"/>
+                <a:cs typeface="Times New Roman" panose="02020603050405020304" pitchFamily="18" charset="0"/>
+              </a:rPr>
+              <a:t>) </a:t>
+            </a:r>
+          </a:p>
+          <a:p>
+            <a:pPr lvl="2" algn="just">
+              <a:buAutoNum type="arabicPeriod"/>
+            </a:pPr>
+            <a:r>
+              <a:rPr lang="pt-BR" sz="1400" dirty="0" err="1">
+                <a:solidFill>
+                  <a:schemeClr val="tx1"/>
+                </a:solidFill>
+                <a:latin typeface="Times New Roman" panose="02020603050405020304" pitchFamily="18" charset="0"/>
+                <a:cs typeface="Times New Roman" panose="02020603050405020304" pitchFamily="18" charset="0"/>
+              </a:rPr>
+              <a:t>Schemas</a:t>
+            </a:r>
+            <a:r>
+              <a:rPr lang="pt-BR" sz="1400" dirty="0">
+                <a:solidFill>
+                  <a:schemeClr val="tx1"/>
+                </a:solidFill>
+                <a:latin typeface="Times New Roman" panose="02020603050405020304" pitchFamily="18" charset="0"/>
+                <a:cs typeface="Times New Roman" panose="02020603050405020304" pitchFamily="18" charset="0"/>
+              </a:rPr>
+              <a:t>/</a:t>
+            </a:r>
+            <a:r>
+              <a:rPr lang="pt-BR" sz="1400" dirty="0" err="1">
+                <a:solidFill>
+                  <a:schemeClr val="tx1"/>
+                </a:solidFill>
+                <a:latin typeface="Times New Roman" panose="02020603050405020304" pitchFamily="18" charset="0"/>
+                <a:cs typeface="Times New Roman" panose="02020603050405020304" pitchFamily="18" charset="0"/>
+              </a:rPr>
+              <a:t>templates</a:t>
+            </a:r>
+            <a:r>
+              <a:rPr lang="pt-BR" sz="1400" dirty="0">
+                <a:solidFill>
+                  <a:schemeClr val="tx1"/>
+                </a:solidFill>
+                <a:latin typeface="Times New Roman" panose="02020603050405020304" pitchFamily="18" charset="0"/>
+                <a:cs typeface="Times New Roman" panose="02020603050405020304" pitchFamily="18" charset="0"/>
+              </a:rPr>
+              <a:t> (</a:t>
+            </a:r>
+            <a:r>
+              <a:rPr lang="pt-BR" sz="1400" b="1" dirty="0" err="1">
+                <a:solidFill>
+                  <a:schemeClr val="tx1"/>
+                </a:solidFill>
+                <a:latin typeface="Times New Roman" panose="02020603050405020304" pitchFamily="18" charset="0"/>
+                <a:cs typeface="Times New Roman" panose="02020603050405020304" pitchFamily="18" charset="0"/>
+              </a:rPr>
+              <a:t>view</a:t>
+            </a:r>
+            <a:r>
+              <a:rPr lang="pt-BR" sz="1400" dirty="0">
+                <a:solidFill>
+                  <a:schemeClr val="tx1"/>
+                </a:solidFill>
+                <a:latin typeface="Times New Roman" panose="02020603050405020304" pitchFamily="18" charset="0"/>
+                <a:cs typeface="Times New Roman" panose="02020603050405020304" pitchFamily="18" charset="0"/>
+              </a:rPr>
+              <a:t>)</a:t>
+            </a:r>
+          </a:p>
+          <a:p>
+            <a:pPr lvl="2" algn="just">
+              <a:buAutoNum type="arabicPeriod"/>
+            </a:pPr>
+            <a:r>
+              <a:rPr lang="pt-BR" sz="1400" dirty="0">
+                <a:solidFill>
+                  <a:schemeClr val="tx1"/>
+                </a:solidFill>
+                <a:latin typeface="Times New Roman" panose="02020603050405020304" pitchFamily="18" charset="0"/>
+                <a:cs typeface="Times New Roman" panose="02020603050405020304" pitchFamily="18" charset="0"/>
+              </a:rPr>
+              <a:t>http</a:t>
+            </a:r>
+          </a:p>
+          <a:p>
+            <a:pPr lvl="3" algn="just">
+              <a:buAutoNum type="arabicPeriod"/>
+            </a:pPr>
+            <a:r>
+              <a:rPr lang="pt-BR" sz="1400" dirty="0">
+                <a:solidFill>
+                  <a:schemeClr val="tx1"/>
+                </a:solidFill>
+                <a:latin typeface="Times New Roman" panose="02020603050405020304" pitchFamily="18" charset="0"/>
+                <a:cs typeface="Times New Roman" panose="02020603050405020304" pitchFamily="18" charset="0"/>
+              </a:rPr>
+              <a:t>Middleware (</a:t>
+            </a:r>
+            <a:r>
+              <a:rPr lang="pt-BR" sz="1400" b="1" dirty="0">
+                <a:solidFill>
+                  <a:schemeClr val="tx1"/>
+                </a:solidFill>
+                <a:latin typeface="Times New Roman" panose="02020603050405020304" pitchFamily="18" charset="0"/>
+                <a:cs typeface="Times New Roman" panose="02020603050405020304" pitchFamily="18" charset="0"/>
+              </a:rPr>
+              <a:t>Aplicação apoio se necessário</a:t>
+            </a:r>
+            <a:r>
+              <a:rPr lang="pt-BR" sz="1400" dirty="0">
+                <a:solidFill>
+                  <a:schemeClr val="tx1"/>
+                </a:solidFill>
+                <a:latin typeface="Times New Roman" panose="02020603050405020304" pitchFamily="18" charset="0"/>
+                <a:cs typeface="Times New Roman" panose="02020603050405020304" pitchFamily="18" charset="0"/>
+              </a:rPr>
+              <a:t>)</a:t>
+            </a:r>
+          </a:p>
+          <a:p>
+            <a:pPr lvl="1" algn="just">
+              <a:buAutoNum type="arabicPeriod"/>
+            </a:pPr>
+            <a:r>
+              <a:rPr lang="pt-BR" sz="1400" dirty="0">
+                <a:solidFill>
+                  <a:schemeClr val="tx1"/>
+                </a:solidFill>
+                <a:latin typeface="Times New Roman" panose="02020603050405020304" pitchFamily="18" charset="0"/>
+                <a:cs typeface="Times New Roman" panose="02020603050405020304" pitchFamily="18" charset="0"/>
+              </a:rPr>
+              <a:t>Includes (</a:t>
+            </a:r>
+            <a:r>
+              <a:rPr lang="pt-BR" sz="1400" b="1" dirty="0">
+                <a:solidFill>
+                  <a:schemeClr val="tx1"/>
+                </a:solidFill>
+                <a:latin typeface="Times New Roman" panose="02020603050405020304" pitchFamily="18" charset="0"/>
+                <a:cs typeface="Times New Roman" panose="02020603050405020304" pitchFamily="18" charset="0"/>
+              </a:rPr>
+              <a:t>bibliotecas do projeto</a:t>
+            </a:r>
+            <a:r>
+              <a:rPr lang="pt-BR" sz="1400" dirty="0">
+                <a:solidFill>
+                  <a:schemeClr val="tx1"/>
+                </a:solidFill>
+                <a:latin typeface="Times New Roman" panose="02020603050405020304" pitchFamily="18" charset="0"/>
+                <a:cs typeface="Times New Roman" panose="02020603050405020304" pitchFamily="18" charset="0"/>
+              </a:rPr>
+              <a:t>)</a:t>
+            </a:r>
+          </a:p>
+          <a:p>
+            <a:pPr lvl="1" algn="just">
+              <a:buAutoNum type="arabicPeriod"/>
+            </a:pPr>
+            <a:r>
+              <a:rPr lang="pt-BR" sz="1400" dirty="0" err="1">
+                <a:solidFill>
+                  <a:schemeClr val="tx1"/>
+                </a:solidFill>
+                <a:latin typeface="Times New Roman" panose="02020603050405020304" pitchFamily="18" charset="0"/>
+                <a:cs typeface="Times New Roman" panose="02020603050405020304" pitchFamily="18" charset="0"/>
+              </a:rPr>
+              <a:t>Resources</a:t>
+            </a:r>
+            <a:r>
+              <a:rPr lang="pt-BR" sz="1400" dirty="0">
+                <a:solidFill>
+                  <a:schemeClr val="tx1"/>
+                </a:solidFill>
+                <a:latin typeface="Times New Roman" panose="02020603050405020304" pitchFamily="18" charset="0"/>
+                <a:cs typeface="Times New Roman" panose="02020603050405020304" pitchFamily="18" charset="0"/>
+              </a:rPr>
+              <a:t> (recursos da aplicação – </a:t>
+            </a:r>
+            <a:r>
+              <a:rPr lang="pt-BR" sz="1400" b="1" dirty="0" err="1">
+                <a:solidFill>
+                  <a:schemeClr val="tx1"/>
+                </a:solidFill>
+                <a:latin typeface="Times New Roman" panose="02020603050405020304" pitchFamily="18" charset="0"/>
+                <a:cs typeface="Times New Roman" panose="02020603050405020304" pitchFamily="18" charset="0"/>
+              </a:rPr>
+              <a:t>endpoints</a:t>
+            </a:r>
+            <a:r>
+              <a:rPr lang="pt-BR" sz="1400" b="1" dirty="0">
+                <a:solidFill>
+                  <a:schemeClr val="tx1"/>
+                </a:solidFill>
+                <a:latin typeface="Times New Roman" panose="02020603050405020304" pitchFamily="18" charset="0"/>
+                <a:cs typeface="Times New Roman" panose="02020603050405020304" pitchFamily="18" charset="0"/>
+              </a:rPr>
+              <a:t>)</a:t>
+            </a:r>
+            <a:endParaRPr lang="pt-BR" sz="1400" dirty="0">
+              <a:solidFill>
+                <a:schemeClr val="tx1"/>
+              </a:solidFill>
               <a:latin typeface="Times New Roman" panose="02020603050405020304" pitchFamily="18" charset="0"/>
               <a:cs typeface="Times New Roman" panose="02020603050405020304" pitchFamily="18" charset="0"/>
             </a:endParaRPr>
           </a:p>
           <a:p>
-            <a:pPr marL="0" indent="0" algn="just">
-              <a:buNone/>
-            </a:pPr>
-            <a:r>
-              <a:rPr lang="pt-BR" sz="2000" dirty="0">
-                <a:latin typeface="Times New Roman" panose="02020603050405020304" pitchFamily="18" charset="0"/>
-                <a:cs typeface="Times New Roman" panose="02020603050405020304" pitchFamily="18" charset="0"/>
-              </a:rPr>
-              <a:t>[2] </a:t>
-            </a:r>
-            <a:r>
-              <a:rPr lang="pt-BR" sz="2000" b="1" dirty="0">
-                <a:latin typeface="Times New Roman" panose="02020603050405020304" pitchFamily="18" charset="0"/>
-                <a:cs typeface="Times New Roman" panose="02020603050405020304" pitchFamily="18" charset="0"/>
-              </a:rPr>
-              <a:t>W3Schools</a:t>
-            </a:r>
-          </a:p>
-          <a:p>
-            <a:pPr marL="0" indent="0" algn="just">
-              <a:buNone/>
-            </a:pPr>
-            <a:r>
-              <a:rPr lang="pt-BR" sz="2000" dirty="0">
-                <a:latin typeface="Times New Roman" panose="02020603050405020304" pitchFamily="18" charset="0"/>
-                <a:cs typeface="Times New Roman" panose="02020603050405020304" pitchFamily="18" charset="0"/>
-              </a:rPr>
-              <a:t>	</a:t>
-            </a:r>
-            <a:r>
-              <a:rPr lang="pt-BR" sz="2000" b="1" dirty="0">
-                <a:latin typeface="Times New Roman" panose="02020603050405020304" pitchFamily="18" charset="0"/>
-                <a:cs typeface="Times New Roman" panose="02020603050405020304" pitchFamily="18" charset="0"/>
-              </a:rPr>
-              <a:t> Disponível em</a:t>
-            </a:r>
-            <a:r>
-              <a:rPr lang="pt-BR" sz="2000" dirty="0">
-                <a:latin typeface="Times New Roman" panose="02020603050405020304" pitchFamily="18" charset="0"/>
-                <a:cs typeface="Times New Roman" panose="02020603050405020304" pitchFamily="18" charset="0"/>
-              </a:rPr>
-              <a:t>: </a:t>
-            </a:r>
-            <a:r>
-              <a:rPr lang="pt-BR" sz="2000" dirty="0">
-                <a:latin typeface="Times New Roman" panose="02020603050405020304" pitchFamily="18" charset="0"/>
-                <a:cs typeface="Times New Roman" panose="02020603050405020304" pitchFamily="18" charset="0"/>
-                <a:hlinkClick r:id="rId4"/>
-              </a:rPr>
-              <a:t>https://www.w3schools.com/php/default.asp</a:t>
-            </a:r>
-            <a:endParaRPr lang="pt-BR" sz="2000" dirty="0">
+            <a:pPr lvl="1" algn="just">
+              <a:buAutoNum type="arabicPeriod"/>
+            </a:pPr>
+            <a:r>
+              <a:rPr lang="pt-BR" sz="1400" dirty="0" err="1">
+                <a:solidFill>
+                  <a:schemeClr val="tx1"/>
+                </a:solidFill>
+                <a:latin typeface="Times New Roman" panose="02020603050405020304" pitchFamily="18" charset="0"/>
+                <a:cs typeface="Times New Roman" panose="02020603050405020304" pitchFamily="18" charset="0"/>
+              </a:rPr>
+              <a:t>Routes</a:t>
+            </a:r>
+            <a:r>
+              <a:rPr lang="pt-BR" sz="1400" dirty="0">
+                <a:solidFill>
+                  <a:schemeClr val="tx1"/>
+                </a:solidFill>
+                <a:latin typeface="Times New Roman" panose="02020603050405020304" pitchFamily="18" charset="0"/>
+                <a:cs typeface="Times New Roman" panose="02020603050405020304" pitchFamily="18" charset="0"/>
+              </a:rPr>
+              <a:t>  (</a:t>
+            </a:r>
+            <a:r>
+              <a:rPr lang="pt-BR" sz="1400" b="1" dirty="0" err="1">
+                <a:solidFill>
+                  <a:schemeClr val="tx1"/>
+                </a:solidFill>
+                <a:latin typeface="Times New Roman" panose="02020603050405020304" pitchFamily="18" charset="0"/>
+                <a:cs typeface="Times New Roman" panose="02020603050405020304" pitchFamily="18" charset="0"/>
+              </a:rPr>
+              <a:t>endpoints</a:t>
+            </a:r>
+            <a:r>
+              <a:rPr lang="pt-BR" sz="1400" dirty="0">
+                <a:solidFill>
+                  <a:schemeClr val="tx1"/>
+                </a:solidFill>
+                <a:latin typeface="Times New Roman" panose="02020603050405020304" pitchFamily="18" charset="0"/>
+                <a:cs typeface="Times New Roman" panose="02020603050405020304" pitchFamily="18" charset="0"/>
+              </a:rPr>
+              <a:t>)</a:t>
+            </a:r>
+          </a:p>
+          <a:p>
+            <a:pPr lvl="1" algn="just">
+              <a:buAutoNum type="arabicPeriod"/>
+            </a:pPr>
+            <a:r>
+              <a:rPr lang="pt-BR" sz="1400" dirty="0" err="1">
+                <a:solidFill>
+                  <a:schemeClr val="tx1"/>
+                </a:solidFill>
+                <a:latin typeface="Times New Roman" panose="02020603050405020304" pitchFamily="18" charset="0"/>
+                <a:cs typeface="Times New Roman" panose="02020603050405020304" pitchFamily="18" charset="0"/>
+              </a:rPr>
+              <a:t>Vendor</a:t>
+            </a:r>
+            <a:r>
+              <a:rPr lang="pt-BR" sz="1400" dirty="0">
+                <a:solidFill>
+                  <a:schemeClr val="tx1"/>
+                </a:solidFill>
+                <a:latin typeface="Times New Roman" panose="02020603050405020304" pitchFamily="18" charset="0"/>
+                <a:cs typeface="Times New Roman" panose="02020603050405020304" pitchFamily="18" charset="0"/>
+              </a:rPr>
+              <a:t> (</a:t>
+            </a:r>
+            <a:r>
+              <a:rPr lang="pt-BR" sz="1400" b="1" dirty="0">
+                <a:solidFill>
+                  <a:schemeClr val="tx1"/>
+                </a:solidFill>
+                <a:latin typeface="Times New Roman" panose="02020603050405020304" pitchFamily="18" charset="0"/>
+                <a:cs typeface="Times New Roman" panose="02020603050405020304" pitchFamily="18" charset="0"/>
+              </a:rPr>
+              <a:t>dependência do projeto com componentes de terceiros, se for o caso...</a:t>
+            </a:r>
+            <a:r>
+              <a:rPr lang="pt-BR" sz="1400" dirty="0">
+                <a:solidFill>
+                  <a:schemeClr val="tx1"/>
+                </a:solidFill>
+                <a:latin typeface="Times New Roman" panose="02020603050405020304" pitchFamily="18" charset="0"/>
+                <a:cs typeface="Times New Roman" panose="02020603050405020304" pitchFamily="18" charset="0"/>
+              </a:rPr>
+              <a:t>)</a:t>
+            </a:r>
+          </a:p>
+          <a:p>
+            <a:pPr lvl="1" algn="just">
+              <a:buAutoNum type="arabicPeriod"/>
+            </a:pPr>
+            <a:endParaRPr lang="pt-BR" sz="1400" dirty="0">
+              <a:solidFill>
+                <a:schemeClr val="tx1"/>
+              </a:solidFill>
               <a:latin typeface="Times New Roman" panose="02020603050405020304" pitchFamily="18" charset="0"/>
               <a:cs typeface="Times New Roman" panose="02020603050405020304" pitchFamily="18" charset="0"/>
             </a:endParaRPr>
@@ -44011,7 +45049,10 @@
             <a:pPr marL="0" indent="0" algn="just">
               <a:buNone/>
             </a:pPr>
-            <a:endParaRPr lang="pt-BR" sz="2000" dirty="0">
+            <a:endParaRPr lang="pt-BR" sz="1400" dirty="0">
+              <a:solidFill>
+                <a:schemeClr val="tx1"/>
+              </a:solidFill>
               <a:latin typeface="Times New Roman" panose="02020603050405020304" pitchFamily="18" charset="0"/>
               <a:cs typeface="Times New Roman" panose="02020603050405020304" pitchFamily="18" charset="0"/>
             </a:endParaRPr>
@@ -44020,77 +45061,10 @@
             <a:pPr marL="0" indent="0" algn="just">
               <a:buNone/>
             </a:pPr>
-            <a:r>
-              <a:rPr lang="pt-BR" sz="2000" dirty="0">
-                <a:latin typeface="Times New Roman" panose="02020603050405020304" pitchFamily="18" charset="0"/>
-                <a:cs typeface="Times New Roman" panose="02020603050405020304" pitchFamily="18" charset="0"/>
-              </a:rPr>
-              <a:t>[3] </a:t>
-            </a:r>
-            <a:r>
-              <a:rPr lang="pt-BR" sz="2000" b="1" dirty="0" err="1">
-                <a:latin typeface="Times New Roman" panose="02020603050405020304" pitchFamily="18" charset="0"/>
-                <a:cs typeface="Times New Roman" panose="02020603050405020304" pitchFamily="18" charset="0"/>
-              </a:rPr>
-              <a:t>DevMedia</a:t>
-            </a:r>
-            <a:endParaRPr lang="pt-BR" sz="2000" b="1" dirty="0">
-              <a:latin typeface="Times New Roman" panose="02020603050405020304" pitchFamily="18" charset="0"/>
-              <a:cs typeface="Times New Roman" panose="02020603050405020304" pitchFamily="18" charset="0"/>
-            </a:endParaRPr>
-          </a:p>
-          <a:p>
-            <a:pPr marL="0" indent="0" algn="just">
-              <a:buNone/>
-            </a:pPr>
-            <a:r>
-              <a:rPr lang="pt-BR" sz="2000" dirty="0">
-                <a:latin typeface="Times New Roman" panose="02020603050405020304" pitchFamily="18" charset="0"/>
-                <a:cs typeface="Times New Roman" panose="02020603050405020304" pitchFamily="18" charset="0"/>
-              </a:rPr>
-              <a:t>	</a:t>
-            </a:r>
-            <a:r>
-              <a:rPr lang="pt-BR" sz="2000" b="1" dirty="0">
-                <a:latin typeface="Times New Roman" panose="02020603050405020304" pitchFamily="18" charset="0"/>
-                <a:cs typeface="Times New Roman" panose="02020603050405020304" pitchFamily="18" charset="0"/>
-              </a:rPr>
-              <a:t> Disponível em</a:t>
-            </a:r>
-            <a:r>
-              <a:rPr lang="pt-BR" sz="2000" dirty="0">
-                <a:latin typeface="Times New Roman" panose="02020603050405020304" pitchFamily="18" charset="0"/>
-                <a:cs typeface="Times New Roman" panose="02020603050405020304" pitchFamily="18" charset="0"/>
-              </a:rPr>
-              <a:t>: </a:t>
-            </a:r>
-            <a:r>
-              <a:rPr lang="pt-BR" sz="2000" dirty="0">
-                <a:latin typeface="Times New Roman" panose="02020603050405020304" pitchFamily="18" charset="0"/>
-                <a:cs typeface="Times New Roman" panose="02020603050405020304" pitchFamily="18" charset="0"/>
-                <a:hlinkClick r:id="rId5"/>
-              </a:rPr>
-              <a:t>https://www.devmedia.com.br/php-pdo-como-criar-sua-primeira-conexao/39007</a:t>
-            </a:r>
-            <a:endParaRPr lang="pt-BR" sz="2000" dirty="0">
-              <a:latin typeface="Times New Roman" panose="02020603050405020304" pitchFamily="18" charset="0"/>
-              <a:cs typeface="Times New Roman" panose="02020603050405020304" pitchFamily="18" charset="0"/>
-            </a:endParaRPr>
-          </a:p>
-          <a:p>
-            <a:pPr marL="0" indent="0" algn="just">
-              <a:buNone/>
-            </a:pPr>
-            <a:endParaRPr lang="pt-BR" sz="2000" dirty="0">
-              <a:latin typeface="Times New Roman" panose="02020603050405020304" pitchFamily="18" charset="0"/>
-              <a:cs typeface="Times New Roman" panose="02020603050405020304" pitchFamily="18" charset="0"/>
-            </a:endParaRPr>
-          </a:p>
-          <a:p>
-            <a:pPr marL="0" indent="0" algn="just">
-              <a:buNone/>
-            </a:pPr>
-            <a:endParaRPr lang="pt-BR" sz="2000" dirty="0">
+            <a:endParaRPr lang="pt-BR" sz="1400" dirty="0">
+              <a:solidFill>
+                <a:schemeClr val="tx1"/>
+              </a:solidFill>
               <a:latin typeface="Times New Roman" panose="02020603050405020304" pitchFamily="18" charset="0"/>
               <a:cs typeface="Times New Roman" panose="02020603050405020304" pitchFamily="18" charset="0"/>
             </a:endParaRPr>
@@ -44100,7 +45074,7 @@
     </p:spTree>
     <p:extLst>
       <p:ext uri="{BB962C8B-B14F-4D97-AF65-F5344CB8AC3E}">
-        <p14:creationId xmlns:p14="http://schemas.microsoft.com/office/powerpoint/2010/main" val="3680270425"/>
+        <p14:creationId xmlns:p14="http://schemas.microsoft.com/office/powerpoint/2010/main" val="3439317978"/>
       </p:ext>
     </p:extLst>
   </p:cSld>
@@ -44156,7 +45130,7 @@
                   <a:srgbClr val="0070C0"/>
                 </a:solidFill>
               </a:rPr>
-              <a:t>Outras</a:t>
+              <a:t>Leitura</a:t>
             </a:r>
             <a:r>
               <a:rPr lang="en-US" b="1" dirty="0">
@@ -44172,7 +45146,7 @@
                   <a:srgbClr val="0070C0"/>
                 </a:solidFill>
               </a:rPr>
-              <a:t>Leituras</a:t>
+              <a:t>Específica</a:t>
             </a:r>
             <a:endParaRPr lang="en-US" b="1" dirty="0">
               <a:solidFill>
@@ -44204,17 +45178,49 @@
           </a:bodyPr>
           <a:lstStyle/>
           <a:p>
-            <a:pPr algn="just">
-              <a:buFont typeface="Wingdings" panose="05000000000000000000" pitchFamily="2" charset="2"/>
-              <a:buChar char="§"/>
+            <a:pPr marL="0" indent="0" algn="just">
+              <a:buNone/>
             </a:pPr>
             <a:r>
               <a:rPr lang="pt-BR" sz="2000" dirty="0">
                 <a:latin typeface="Times New Roman" panose="02020603050405020304" pitchFamily="18" charset="0"/>
                 <a:cs typeface="Times New Roman" panose="02020603050405020304" pitchFamily="18" charset="0"/>
+              </a:rPr>
+              <a:t>[1] </a:t>
+            </a:r>
+            <a:r>
+              <a:rPr lang="pt-BR" sz="2000" b="1" dirty="0">
+                <a:latin typeface="Times New Roman" panose="02020603050405020304" pitchFamily="18" charset="0"/>
+                <a:cs typeface="Times New Roman" panose="02020603050405020304" pitchFamily="18" charset="0"/>
+              </a:rPr>
+              <a:t>PHP</a:t>
+            </a:r>
+          </a:p>
+          <a:p>
+            <a:pPr marL="0" indent="0" algn="just">
+              <a:buNone/>
+            </a:pPr>
+            <a:r>
+              <a:rPr lang="pt-BR" sz="2000" b="1" dirty="0">
+                <a:latin typeface="Times New Roman" panose="02020603050405020304" pitchFamily="18" charset="0"/>
+                <a:cs typeface="Times New Roman" panose="02020603050405020304" pitchFamily="18" charset="0"/>
+              </a:rPr>
+              <a:t>	Disponível em</a:t>
+            </a:r>
+            <a:r>
+              <a:rPr lang="pt-BR" sz="2000" dirty="0">
+                <a:latin typeface="Times New Roman" panose="02020603050405020304" pitchFamily="18" charset="0"/>
+                <a:cs typeface="Times New Roman" panose="02020603050405020304" pitchFamily="18" charset="0"/>
+              </a:rPr>
+              <a:t>: </a:t>
+            </a:r>
+            <a:r>
+              <a:rPr lang="pt-BR" sz="2000" dirty="0">
+                <a:latin typeface="Times New Roman" panose="02020603050405020304" pitchFamily="18" charset="0"/>
+                <a:cs typeface="Times New Roman" panose="02020603050405020304" pitchFamily="18" charset="0"/>
                 <a:hlinkClick r:id="rId3"/>
               </a:rPr>
-              <a:t>https://www.devmedia.com.br/php-pdo-como-criar-sua-primeira-conexao/39007</a:t>
+              <a:t>https://www.php.net/</a:t>
             </a:r>
             <a:endParaRPr lang="pt-BR" sz="2000" dirty="0">
               <a:latin typeface="Times New Roman" panose="02020603050405020304" pitchFamily="18" charset="0"/>
@@ -44222,35 +45228,65 @@
             </a:endParaRPr>
           </a:p>
           <a:p>
-            <a:pPr algn="just">
-              <a:buFont typeface="Wingdings" panose="05000000000000000000" pitchFamily="2" charset="2"/>
-              <a:buChar char="§"/>
-            </a:pPr>
-            <a:r>
-              <a:rPr lang="pt-BR" sz="2000" dirty="0">
-                <a:latin typeface="Times New Roman" panose="02020603050405020304" pitchFamily="18" charset="0"/>
-                <a:cs typeface="Times New Roman" panose="02020603050405020304" pitchFamily="18" charset="0"/>
-                <a:hlinkClick r:id="rId4"/>
-              </a:rPr>
-              <a:t>http://www.bosontreinamentos.com.br/php-programming/curso-de-php-consulta-com-pesquisa-de-dados-em-banco-mysql/</a:t>
-            </a:r>
+            <a:pPr marL="0" indent="0" algn="just">
+              <a:buNone/>
+            </a:pPr>
             <a:endParaRPr lang="pt-BR" sz="2000" dirty="0">
               <a:latin typeface="Times New Roman" panose="02020603050405020304" pitchFamily="18" charset="0"/>
               <a:cs typeface="Times New Roman" panose="02020603050405020304" pitchFamily="18" charset="0"/>
             </a:endParaRPr>
           </a:p>
           <a:p>
-            <a:pPr algn="just">
-              <a:buFont typeface="Wingdings" panose="05000000000000000000" pitchFamily="2" charset="2"/>
-              <a:buChar char="§"/>
+            <a:pPr marL="0" indent="0" algn="just">
+              <a:buNone/>
             </a:pPr>
             <a:r>
               <a:rPr lang="pt-BR" sz="2000" dirty="0">
                 <a:latin typeface="Times New Roman" panose="02020603050405020304" pitchFamily="18" charset="0"/>
                 <a:cs typeface="Times New Roman" panose="02020603050405020304" pitchFamily="18" charset="0"/>
-                <a:hlinkClick r:id="rId5"/>
-              </a:rPr>
-              <a:t>https://www.hostinger.com.br/tutoriais/como-inserir-dados-no-mysql-com-php</a:t>
+              </a:rPr>
+              <a:t>[2] </a:t>
+            </a:r>
+            <a:r>
+              <a:rPr lang="pt-BR" sz="2000" b="1" dirty="0">
+                <a:latin typeface="Times New Roman" panose="02020603050405020304" pitchFamily="18" charset="0"/>
+                <a:cs typeface="Times New Roman" panose="02020603050405020304" pitchFamily="18" charset="0"/>
+              </a:rPr>
+              <a:t>W3Schools</a:t>
+            </a:r>
+          </a:p>
+          <a:p>
+            <a:pPr marL="0" indent="0" algn="just">
+              <a:buNone/>
+            </a:pPr>
+            <a:r>
+              <a:rPr lang="pt-BR" sz="2000" dirty="0">
+                <a:latin typeface="Times New Roman" panose="02020603050405020304" pitchFamily="18" charset="0"/>
+                <a:cs typeface="Times New Roman" panose="02020603050405020304" pitchFamily="18" charset="0"/>
+              </a:rPr>
+              <a:t>	</a:t>
+            </a:r>
+            <a:r>
+              <a:rPr lang="pt-BR" sz="2000" b="1" dirty="0">
+                <a:latin typeface="Times New Roman" panose="02020603050405020304" pitchFamily="18" charset="0"/>
+                <a:cs typeface="Times New Roman" panose="02020603050405020304" pitchFamily="18" charset="0"/>
+              </a:rPr>
+              <a:t> Disponível em</a:t>
+            </a:r>
+            <a:r>
+              <a:rPr lang="pt-BR" sz="2000" dirty="0">
+                <a:latin typeface="Times New Roman" panose="02020603050405020304" pitchFamily="18" charset="0"/>
+                <a:cs typeface="Times New Roman" panose="02020603050405020304" pitchFamily="18" charset="0"/>
+              </a:rPr>
+              <a:t>: </a:t>
+            </a:r>
+            <a:r>
+              <a:rPr lang="pt-BR" sz="2000" dirty="0">
+                <a:latin typeface="Times New Roman" panose="02020603050405020304" pitchFamily="18" charset="0"/>
+                <a:cs typeface="Times New Roman" panose="02020603050405020304" pitchFamily="18" charset="0"/>
+                <a:hlinkClick r:id="rId4"/>
+              </a:rPr>
+              <a:t>https://www.w3schools.com/php/default.asp</a:t>
             </a:r>
             <a:endParaRPr lang="pt-BR" sz="2000" dirty="0">
               <a:latin typeface="Times New Roman" panose="02020603050405020304" pitchFamily="18" charset="0"/>
@@ -44258,35 +45294,69 @@
             </a:endParaRPr>
           </a:p>
           <a:p>
-            <a:pPr algn="just">
-              <a:buFont typeface="Wingdings" panose="05000000000000000000" pitchFamily="2" charset="2"/>
-              <a:buChar char="§"/>
-            </a:pPr>
-            <a:r>
-              <a:rPr lang="pt-BR" sz="2000" dirty="0">
-                <a:latin typeface="Times New Roman" panose="02020603050405020304" pitchFamily="18" charset="0"/>
-                <a:cs typeface="Times New Roman" panose="02020603050405020304" pitchFamily="18" charset="0"/>
-                <a:hlinkClick r:id="rId6"/>
-              </a:rPr>
-              <a:t>https://monsieurbricole.wordpress.com/2009/10/20/php-how-to-insert-data-into-database-using-pdo-registry-system-in-php/</a:t>
-            </a:r>
+            <a:pPr marL="0" indent="0" algn="just">
+              <a:buNone/>
+            </a:pPr>
             <a:endParaRPr lang="pt-BR" sz="2000" dirty="0">
               <a:latin typeface="Times New Roman" panose="02020603050405020304" pitchFamily="18" charset="0"/>
               <a:cs typeface="Times New Roman" panose="02020603050405020304" pitchFamily="18" charset="0"/>
             </a:endParaRPr>
           </a:p>
           <a:p>
-            <a:pPr algn="just">
-              <a:buFont typeface="Wingdings" panose="05000000000000000000" pitchFamily="2" charset="2"/>
-              <a:buChar char="§"/>
+            <a:pPr marL="0" indent="0" algn="just">
+              <a:buNone/>
             </a:pPr>
             <a:r>
               <a:rPr lang="pt-BR" sz="2000" dirty="0">
                 <a:latin typeface="Times New Roman" panose="02020603050405020304" pitchFamily="18" charset="0"/>
                 <a:cs typeface="Times New Roman" panose="02020603050405020304" pitchFamily="18" charset="0"/>
-                <a:hlinkClick r:id="rId7"/>
-              </a:rPr>
-              <a:t>https://stackoverflow.com/questions/8640808/php-pdo-prepared-delete-why-does-this-fail</a:t>
+              </a:rPr>
+              <a:t>[3] </a:t>
+            </a:r>
+            <a:r>
+              <a:rPr lang="pt-BR" sz="2000" b="1" dirty="0" err="1">
+                <a:latin typeface="Times New Roman" panose="02020603050405020304" pitchFamily="18" charset="0"/>
+                <a:cs typeface="Times New Roman" panose="02020603050405020304" pitchFamily="18" charset="0"/>
+              </a:rPr>
+              <a:t>DevMedia</a:t>
+            </a:r>
+            <a:endParaRPr lang="pt-BR" sz="2000" b="1" dirty="0">
+              <a:latin typeface="Times New Roman" panose="02020603050405020304" pitchFamily="18" charset="0"/>
+              <a:cs typeface="Times New Roman" panose="02020603050405020304" pitchFamily="18" charset="0"/>
+            </a:endParaRPr>
+          </a:p>
+          <a:p>
+            <a:pPr marL="0" indent="0" algn="just">
+              <a:buNone/>
+            </a:pPr>
+            <a:r>
+              <a:rPr lang="pt-BR" sz="2000" dirty="0">
+                <a:latin typeface="Times New Roman" panose="02020603050405020304" pitchFamily="18" charset="0"/>
+                <a:cs typeface="Times New Roman" panose="02020603050405020304" pitchFamily="18" charset="0"/>
+              </a:rPr>
+              <a:t>	</a:t>
+            </a:r>
+            <a:r>
+              <a:rPr lang="pt-BR" sz="2000" b="1" dirty="0">
+                <a:latin typeface="Times New Roman" panose="02020603050405020304" pitchFamily="18" charset="0"/>
+                <a:cs typeface="Times New Roman" panose="02020603050405020304" pitchFamily="18" charset="0"/>
+              </a:rPr>
+              <a:t> Disponível em</a:t>
+            </a:r>
+            <a:r>
+              <a:rPr lang="pt-BR" sz="2000" dirty="0">
+                <a:latin typeface="Times New Roman" panose="02020603050405020304" pitchFamily="18" charset="0"/>
+                <a:cs typeface="Times New Roman" panose="02020603050405020304" pitchFamily="18" charset="0"/>
+              </a:rPr>
+              <a:t>: </a:t>
+            </a:r>
+            <a:r>
+              <a:rPr lang="pt-BR" sz="2000" dirty="0">
+                <a:latin typeface="Times New Roman" panose="02020603050405020304" pitchFamily="18" charset="0"/>
+                <a:cs typeface="Times New Roman" panose="02020603050405020304" pitchFamily="18" charset="0"/>
+                <a:hlinkClick r:id="rId5"/>
+              </a:rPr>
+              <a:t>https://www.devmedia.com.br/php-pdo-como-criar-sua-primeira-conexao/39007</a:t>
             </a:r>
             <a:endParaRPr lang="pt-BR" sz="2000" dirty="0">
               <a:latin typeface="Times New Roman" panose="02020603050405020304" pitchFamily="18" charset="0"/>
@@ -44294,50 +45364,29 @@
             </a:endParaRPr>
           </a:p>
           <a:p>
-            <a:pPr algn="just">
-              <a:buFont typeface="Wingdings" panose="05000000000000000000" pitchFamily="2" charset="2"/>
-              <a:buChar char="§"/>
-            </a:pPr>
-            <a:r>
-              <a:rPr lang="pt-BR" sz="2000" dirty="0">
-                <a:latin typeface="Times New Roman" panose="02020603050405020304" pitchFamily="18" charset="0"/>
-                <a:cs typeface="Times New Roman" panose="02020603050405020304" pitchFamily="18" charset="0"/>
-                <a:hlinkClick r:id="rId8"/>
-              </a:rPr>
-              <a:t>https://pt.stackoverflow.com/questions/16288/fechar-conex%c3%a3o-pdo</a:t>
-            </a:r>
+            <a:pPr marL="0" indent="0" algn="just">
+              <a:buNone/>
+            </a:pPr>
             <a:endParaRPr lang="pt-BR" sz="2000" dirty="0">
               <a:latin typeface="Times New Roman" panose="02020603050405020304" pitchFamily="18" charset="0"/>
               <a:cs typeface="Times New Roman" panose="02020603050405020304" pitchFamily="18" charset="0"/>
             </a:endParaRPr>
           </a:p>
           <a:p>
-            <a:pPr algn="just">
-              <a:buFont typeface="Wingdings" panose="05000000000000000000" pitchFamily="2" charset="2"/>
-              <a:buChar char="§"/>
-            </a:pPr>
-            <a:r>
-              <a:rPr lang="pt-BR" sz="2000" dirty="0">
-                <a:latin typeface="Times New Roman" panose="02020603050405020304" pitchFamily="18" charset="0"/>
-                <a:cs typeface="Times New Roman" panose="02020603050405020304" pitchFamily="18" charset="0"/>
-                <a:hlinkClick r:id="rId9"/>
-              </a:rPr>
-              <a:t>https://codigosimples.net/2017/02/27/usando-extensao-mssql-para-o-vscode/</a:t>
-            </a:r>
-            <a:r>
-              <a:rPr lang="pt-BR" sz="2000" dirty="0">
-                <a:latin typeface="Times New Roman" panose="02020603050405020304" pitchFamily="18" charset="0"/>
-                <a:cs typeface="Times New Roman" panose="02020603050405020304" pitchFamily="18" charset="0"/>
-              </a:rPr>
-              <a:t> </a:t>
-            </a:r>
+            <a:pPr marL="0" indent="0" algn="just">
+              <a:buNone/>
+            </a:pPr>
+            <a:endParaRPr lang="pt-BR" sz="2000" dirty="0">
+              <a:latin typeface="Times New Roman" panose="02020603050405020304" pitchFamily="18" charset="0"/>
+              <a:cs typeface="Times New Roman" panose="02020603050405020304" pitchFamily="18" charset="0"/>
+            </a:endParaRPr>
           </a:p>
         </p:txBody>
       </p:sp>
     </p:spTree>
     <p:extLst>
       <p:ext uri="{BB962C8B-B14F-4D97-AF65-F5344CB8AC3E}">
-        <p14:creationId xmlns:p14="http://schemas.microsoft.com/office/powerpoint/2010/main" val="3582185216"/>
+        <p14:creationId xmlns:p14="http://schemas.microsoft.com/office/powerpoint/2010/main" val="3680270425"/>
       </p:ext>
     </p:extLst>
   </p:cSld>
@@ -44393,7 +45442,7 @@
                   <a:srgbClr val="0070C0"/>
                 </a:solidFill>
               </a:rPr>
-              <a:t>Aprenda</a:t>
+              <a:t>Outras</a:t>
             </a:r>
             <a:r>
               <a:rPr lang="en-US" b="1" dirty="0">
@@ -44401,8 +45450,21 @@
                   <a:srgbClr val="0070C0"/>
                 </a:solidFill>
               </a:rPr>
-              <a:t>+</a:t>
-            </a:r>
+              <a:t> </a:t>
+            </a:r>
+            <a:r>
+              <a:rPr lang="en-US" b="1" dirty="0" err="1">
+                <a:solidFill>
+                  <a:srgbClr val="0070C0"/>
+                </a:solidFill>
+              </a:rPr>
+              <a:t>Leituras</a:t>
+            </a:r>
+            <a:endParaRPr lang="en-US" b="1" dirty="0">
+              <a:solidFill>
+                <a:srgbClr val="0070C0"/>
+              </a:solidFill>
+            </a:endParaRPr>
           </a:p>
         </p:txBody>
       </p:sp>
@@ -44418,8 +45480,8 @@
         </p:nvSpPr>
         <p:spPr>
           <a:xfrm>
-            <a:off x="142865" y="1200151"/>
-            <a:ext cx="8865056" cy="3394472"/>
+            <a:off x="142865" y="1012261"/>
+            <a:ext cx="8865056" cy="3835312"/>
           </a:xfrm>
         </p:spPr>
         <p:txBody>
@@ -44428,188 +45490,140 @@
           </a:bodyPr>
           <a:lstStyle/>
           <a:p>
-            <a:pPr marL="0" indent="0" algn="just">
-              <a:buNone/>
-            </a:pPr>
-            <a:endParaRPr lang="pt-BR" sz="2400" dirty="0">
+            <a:pPr algn="just">
+              <a:buFont typeface="Wingdings" panose="05000000000000000000" pitchFamily="2" charset="2"/>
+              <a:buChar char="§"/>
+            </a:pPr>
+            <a:r>
+              <a:rPr lang="pt-BR" sz="2000" dirty="0">
+                <a:latin typeface="Times New Roman" panose="02020603050405020304" pitchFamily="18" charset="0"/>
+                <a:cs typeface="Times New Roman" panose="02020603050405020304" pitchFamily="18" charset="0"/>
+                <a:hlinkClick r:id="rId3"/>
+              </a:rPr>
+              <a:t>https://www.devmedia.com.br/php-pdo-como-criar-sua-primeira-conexao/39007</a:t>
+            </a:r>
+            <a:endParaRPr lang="pt-BR" sz="2000" dirty="0">
               <a:latin typeface="Times New Roman" panose="02020603050405020304" pitchFamily="18" charset="0"/>
               <a:cs typeface="Times New Roman" panose="02020603050405020304" pitchFamily="18" charset="0"/>
             </a:endParaRPr>
           </a:p>
           <a:p>
-            <a:pPr marL="0" indent="0" algn="just">
-              <a:buNone/>
-            </a:pPr>
-            <a:r>
-              <a:rPr lang="pt-BR" sz="2400" dirty="0">
-                <a:latin typeface="Times New Roman" panose="02020603050405020304" pitchFamily="18" charset="0"/>
-                <a:cs typeface="Times New Roman" panose="02020603050405020304" pitchFamily="18" charset="0"/>
-              </a:rPr>
-              <a:t>[1] Construindo classes no PHP orientado a objetos</a:t>
-            </a:r>
-          </a:p>
-          <a:p>
-            <a:pPr marL="0" indent="0" algn="just">
-              <a:buNone/>
-            </a:pPr>
-            <a:r>
-              <a:rPr lang="pt-BR" sz="2400" dirty="0">
-                <a:latin typeface="Times New Roman" panose="02020603050405020304" pitchFamily="18" charset="0"/>
-                <a:cs typeface="Times New Roman" panose="02020603050405020304" pitchFamily="18" charset="0"/>
-              </a:rPr>
-              <a:t>	</a:t>
-            </a:r>
-            <a:r>
-              <a:rPr lang="pt-BR" sz="2400" dirty="0">
-                <a:latin typeface="Times New Roman" panose="02020603050405020304" pitchFamily="18" charset="0"/>
-                <a:cs typeface="Times New Roman" panose="02020603050405020304" pitchFamily="18" charset="0"/>
-                <a:hlinkClick r:id="rId3"/>
-              </a:rPr>
-              <a:t>https://www.youtube.com/watch?v=xoH1WDI9l0I</a:t>
-            </a:r>
-            <a:endParaRPr lang="pt-BR" sz="2400" dirty="0">
+            <a:pPr algn="just">
+              <a:buFont typeface="Wingdings" panose="05000000000000000000" pitchFamily="2" charset="2"/>
+              <a:buChar char="§"/>
+            </a:pPr>
+            <a:r>
+              <a:rPr lang="pt-BR" sz="2000" dirty="0">
+                <a:latin typeface="Times New Roman" panose="02020603050405020304" pitchFamily="18" charset="0"/>
+                <a:cs typeface="Times New Roman" panose="02020603050405020304" pitchFamily="18" charset="0"/>
+                <a:hlinkClick r:id="rId4"/>
+              </a:rPr>
+              <a:t>http://www.bosontreinamentos.com.br/php-programming/curso-de-php-consulta-com-pesquisa-de-dados-em-banco-mysql/</a:t>
+            </a:r>
+            <a:endParaRPr lang="pt-BR" sz="2000" dirty="0">
               <a:latin typeface="Times New Roman" panose="02020603050405020304" pitchFamily="18" charset="0"/>
               <a:cs typeface="Times New Roman" panose="02020603050405020304" pitchFamily="18" charset="0"/>
             </a:endParaRPr>
           </a:p>
           <a:p>
-            <a:pPr marL="0" indent="0" algn="just">
-              <a:buNone/>
-            </a:pPr>
-            <a:endParaRPr lang="pt-BR" sz="2400" dirty="0">
+            <a:pPr algn="just">
+              <a:buFont typeface="Wingdings" panose="05000000000000000000" pitchFamily="2" charset="2"/>
+              <a:buChar char="§"/>
+            </a:pPr>
+            <a:r>
+              <a:rPr lang="pt-BR" sz="2000" dirty="0">
+                <a:latin typeface="Times New Roman" panose="02020603050405020304" pitchFamily="18" charset="0"/>
+                <a:cs typeface="Times New Roman" panose="02020603050405020304" pitchFamily="18" charset="0"/>
+                <a:hlinkClick r:id="rId5"/>
+              </a:rPr>
+              <a:t>https://www.hostinger.com.br/tutoriais/como-inserir-dados-no-mysql-com-php</a:t>
+            </a:r>
+            <a:endParaRPr lang="pt-BR" sz="2000" dirty="0">
               <a:latin typeface="Times New Roman" panose="02020603050405020304" pitchFamily="18" charset="0"/>
               <a:cs typeface="Times New Roman" panose="02020603050405020304" pitchFamily="18" charset="0"/>
             </a:endParaRPr>
           </a:p>
           <a:p>
-            <a:pPr marL="0" indent="0" algn="just">
-              <a:buNone/>
-            </a:pPr>
-            <a:r>
-              <a:rPr lang="pt-BR" sz="2400" dirty="0">
-                <a:latin typeface="Times New Roman" panose="02020603050405020304" pitchFamily="18" charset="0"/>
-                <a:cs typeface="Times New Roman" panose="02020603050405020304" pitchFamily="18" charset="0"/>
-              </a:rPr>
-              <a:t>[2] </a:t>
-            </a:r>
-            <a:r>
-              <a:rPr lang="pt-BR" sz="2400" dirty="0" err="1">
-                <a:latin typeface="Times New Roman" panose="02020603050405020304" pitchFamily="18" charset="0"/>
-                <a:cs typeface="Times New Roman" panose="02020603050405020304" pitchFamily="18" charset="0"/>
-              </a:rPr>
-              <a:t>Creating</a:t>
-            </a:r>
-            <a:r>
-              <a:rPr lang="pt-BR" sz="2400" dirty="0">
-                <a:latin typeface="Times New Roman" panose="02020603050405020304" pitchFamily="18" charset="0"/>
-                <a:cs typeface="Times New Roman" panose="02020603050405020304" pitchFamily="18" charset="0"/>
-              </a:rPr>
-              <a:t> classes, </a:t>
-            </a:r>
-            <a:r>
-              <a:rPr lang="pt-BR" sz="2400" dirty="0" err="1">
-                <a:latin typeface="Times New Roman" panose="02020603050405020304" pitchFamily="18" charset="0"/>
-                <a:cs typeface="Times New Roman" panose="02020603050405020304" pitchFamily="18" charset="0"/>
-              </a:rPr>
-              <a:t>properties</a:t>
-            </a:r>
-            <a:r>
-              <a:rPr lang="pt-BR" sz="2400" dirty="0">
-                <a:latin typeface="Times New Roman" panose="02020603050405020304" pitchFamily="18" charset="0"/>
-                <a:cs typeface="Times New Roman" panose="02020603050405020304" pitchFamily="18" charset="0"/>
-              </a:rPr>
-              <a:t>, </a:t>
-            </a:r>
-            <a:r>
-              <a:rPr lang="pt-BR" sz="2400" dirty="0" err="1">
-                <a:latin typeface="Times New Roman" panose="02020603050405020304" pitchFamily="18" charset="0"/>
-                <a:cs typeface="Times New Roman" panose="02020603050405020304" pitchFamily="18" charset="0"/>
-              </a:rPr>
-              <a:t>methods</a:t>
-            </a:r>
-            <a:r>
-              <a:rPr lang="pt-BR" sz="2400" dirty="0">
-                <a:latin typeface="Times New Roman" panose="02020603050405020304" pitchFamily="18" charset="0"/>
-                <a:cs typeface="Times New Roman" panose="02020603050405020304" pitchFamily="18" charset="0"/>
-              </a:rPr>
-              <a:t> - OOP in PHP – Part 1</a:t>
-            </a:r>
-          </a:p>
-          <a:p>
-            <a:pPr marL="0" indent="0" algn="just">
-              <a:buNone/>
-            </a:pPr>
-            <a:r>
-              <a:rPr lang="pt-BR" sz="2400" dirty="0">
-                <a:latin typeface="Times New Roman" panose="02020603050405020304" pitchFamily="18" charset="0"/>
-                <a:cs typeface="Times New Roman" panose="02020603050405020304" pitchFamily="18" charset="0"/>
-              </a:rPr>
-              <a:t>	</a:t>
-            </a:r>
-            <a:r>
-              <a:rPr lang="pt-BR" sz="2400" dirty="0">
-                <a:latin typeface="Times New Roman" panose="02020603050405020304" pitchFamily="18" charset="0"/>
-                <a:cs typeface="Times New Roman" panose="02020603050405020304" pitchFamily="18" charset="0"/>
-                <a:hlinkClick r:id="rId4"/>
-              </a:rPr>
-              <a:t>https://www.youtube.com/watch?v=4xvCT7UPY3k</a:t>
-            </a:r>
-            <a:endParaRPr lang="pt-BR" sz="2400" dirty="0">
+            <a:pPr algn="just">
+              <a:buFont typeface="Wingdings" panose="05000000000000000000" pitchFamily="2" charset="2"/>
+              <a:buChar char="§"/>
+            </a:pPr>
+            <a:r>
+              <a:rPr lang="pt-BR" sz="2000" dirty="0">
+                <a:latin typeface="Times New Roman" panose="02020603050405020304" pitchFamily="18" charset="0"/>
+                <a:cs typeface="Times New Roman" panose="02020603050405020304" pitchFamily="18" charset="0"/>
+                <a:hlinkClick r:id="rId6"/>
+              </a:rPr>
+              <a:t>https://monsieurbricole.wordpress.com/2009/10/20/php-how-to-insert-data-into-database-using-pdo-registry-system-in-php/</a:t>
+            </a:r>
+            <a:endParaRPr lang="pt-BR" sz="2000" dirty="0">
               <a:latin typeface="Times New Roman" panose="02020603050405020304" pitchFamily="18" charset="0"/>
               <a:cs typeface="Times New Roman" panose="02020603050405020304" pitchFamily="18" charset="0"/>
             </a:endParaRPr>
           </a:p>
           <a:p>
-            <a:pPr marL="0" indent="0" algn="just">
-              <a:buNone/>
-            </a:pPr>
-            <a:endParaRPr lang="pt-BR" sz="2400" dirty="0">
+            <a:pPr algn="just">
+              <a:buFont typeface="Wingdings" panose="05000000000000000000" pitchFamily="2" charset="2"/>
+              <a:buChar char="§"/>
+            </a:pPr>
+            <a:r>
+              <a:rPr lang="pt-BR" sz="2000" dirty="0">
+                <a:latin typeface="Times New Roman" panose="02020603050405020304" pitchFamily="18" charset="0"/>
+                <a:cs typeface="Times New Roman" panose="02020603050405020304" pitchFamily="18" charset="0"/>
+                <a:hlinkClick r:id="rId7"/>
+              </a:rPr>
+              <a:t>https://stackoverflow.com/questions/8640808/php-pdo-prepared-delete-why-does-this-fail</a:t>
+            </a:r>
+            <a:endParaRPr lang="pt-BR" sz="2000" dirty="0">
               <a:latin typeface="Times New Roman" panose="02020603050405020304" pitchFamily="18" charset="0"/>
               <a:cs typeface="Times New Roman" panose="02020603050405020304" pitchFamily="18" charset="0"/>
             </a:endParaRPr>
           </a:p>
           <a:p>
-            <a:pPr marL="0" indent="0" algn="just">
-              <a:buNone/>
-            </a:pPr>
-            <a:endParaRPr lang="pt-BR" sz="2400" dirty="0">
+            <a:pPr algn="just">
+              <a:buFont typeface="Wingdings" panose="05000000000000000000" pitchFamily="2" charset="2"/>
+              <a:buChar char="§"/>
+            </a:pPr>
+            <a:r>
+              <a:rPr lang="pt-BR" sz="2000" dirty="0">
+                <a:latin typeface="Times New Roman" panose="02020603050405020304" pitchFamily="18" charset="0"/>
+                <a:cs typeface="Times New Roman" panose="02020603050405020304" pitchFamily="18" charset="0"/>
+                <a:hlinkClick r:id="rId8"/>
+              </a:rPr>
+              <a:t>https://pt.stackoverflow.com/questions/16288/fechar-conex%c3%a3o-pdo</a:t>
+            </a:r>
+            <a:endParaRPr lang="pt-BR" sz="2000" dirty="0">
               <a:latin typeface="Times New Roman" panose="02020603050405020304" pitchFamily="18" charset="0"/>
               <a:cs typeface="Times New Roman" panose="02020603050405020304" pitchFamily="18" charset="0"/>
             </a:endParaRPr>
           </a:p>
           <a:p>
-            <a:pPr marL="0" indent="0" algn="just">
-              <a:buNone/>
-            </a:pPr>
-            <a:endParaRPr lang="pt-BR" sz="2400" dirty="0">
-              <a:latin typeface="Times New Roman" panose="02020603050405020304" pitchFamily="18" charset="0"/>
-              <a:cs typeface="Times New Roman" panose="02020603050405020304" pitchFamily="18" charset="0"/>
-            </a:endParaRPr>
-          </a:p>
-          <a:p>
-            <a:pPr marL="0" indent="0" algn="just">
-              <a:buNone/>
-            </a:pPr>
-            <a:endParaRPr lang="pt-BR" sz="2400" dirty="0">
-              <a:latin typeface="Times New Roman" panose="02020603050405020304" pitchFamily="18" charset="0"/>
-              <a:cs typeface="Times New Roman" panose="02020603050405020304" pitchFamily="18" charset="0"/>
-            </a:endParaRPr>
-          </a:p>
-          <a:p>
-            <a:pPr marL="0" indent="0" algn="just">
-              <a:buNone/>
-            </a:pPr>
-            <a:endParaRPr lang="pt-BR" sz="2400" dirty="0">
-              <a:latin typeface="Times New Roman" panose="02020603050405020304" pitchFamily="18" charset="0"/>
-              <a:cs typeface="Times New Roman" panose="02020603050405020304" pitchFamily="18" charset="0"/>
-            </a:endParaRPr>
+            <a:pPr algn="just">
+              <a:buFont typeface="Wingdings" panose="05000000000000000000" pitchFamily="2" charset="2"/>
+              <a:buChar char="§"/>
+            </a:pPr>
+            <a:r>
+              <a:rPr lang="pt-BR" sz="2000" dirty="0">
+                <a:latin typeface="Times New Roman" panose="02020603050405020304" pitchFamily="18" charset="0"/>
+                <a:cs typeface="Times New Roman" panose="02020603050405020304" pitchFamily="18" charset="0"/>
+                <a:hlinkClick r:id="rId9"/>
+              </a:rPr>
+              <a:t>https://codigosimples.net/2017/02/27/usando-extensao-mssql-para-o-vscode/</a:t>
+            </a:r>
+            <a:r>
+              <a:rPr lang="pt-BR" sz="2000" dirty="0">
+                <a:latin typeface="Times New Roman" panose="02020603050405020304" pitchFamily="18" charset="0"/>
+                <a:cs typeface="Times New Roman" panose="02020603050405020304" pitchFamily="18" charset="0"/>
+              </a:rPr>
+              <a:t> </a:t>
+            </a:r>
           </a:p>
         </p:txBody>
       </p:sp>
     </p:spTree>
     <p:extLst>
       <p:ext uri="{BB962C8B-B14F-4D97-AF65-F5344CB8AC3E}">
-        <p14:creationId xmlns:p14="http://schemas.microsoft.com/office/powerpoint/2010/main" val="2747596967"/>
+        <p14:creationId xmlns:p14="http://schemas.microsoft.com/office/powerpoint/2010/main" val="3582185216"/>
       </p:ext>
     </p:extLst>
   </p:cSld>
@@ -44665,7 +45679,7 @@
                   <a:srgbClr val="0070C0"/>
                 </a:solidFill>
               </a:rPr>
-              <a:t>Dinâmica</a:t>
+              <a:t>Aprenda</a:t>
             </a:r>
             <a:r>
               <a:rPr lang="en-US" b="1" dirty="0">
@@ -44673,21 +45687,8 @@
                   <a:srgbClr val="0070C0"/>
                 </a:solidFill>
               </a:rPr>
-              <a:t>/</a:t>
-            </a:r>
-            <a:r>
-              <a:rPr lang="en-US" b="1" dirty="0" err="1">
-                <a:solidFill>
-                  <a:srgbClr val="0070C0"/>
-                </a:solidFill>
-              </a:rPr>
-              <a:t>Atividades</a:t>
-            </a:r>
-            <a:endParaRPr lang="en-US" b="1" dirty="0">
-              <a:solidFill>
-                <a:srgbClr val="0070C0"/>
-              </a:solidFill>
-            </a:endParaRPr>
+              <a:t>+</a:t>
+            </a:r>
           </a:p>
         </p:txBody>
       </p:sp>
@@ -44703,8 +45704,8 @@
         </p:nvSpPr>
         <p:spPr>
           <a:xfrm>
-            <a:off x="139472" y="1063230"/>
-            <a:ext cx="8865056" cy="3606305"/>
+            <a:off x="142865" y="1200151"/>
+            <a:ext cx="8865056" cy="3394472"/>
           </a:xfrm>
         </p:spPr>
         <p:txBody>
@@ -44713,105 +45714,10 @@
           </a:bodyPr>
           <a:lstStyle/>
           <a:p>
-            <a:pPr algn="just">
-              <a:buFontTx/>
-              <a:buChar char="-"/>
-            </a:pPr>
-            <a:r>
-              <a:rPr lang="pt-BR" dirty="0">
-                <a:latin typeface="Times New Roman" panose="02020603050405020304" pitchFamily="18" charset="0"/>
-                <a:cs typeface="Times New Roman" panose="02020603050405020304" pitchFamily="18" charset="0"/>
-              </a:rPr>
-              <a:t>Exercícios de Fixação </a:t>
-            </a:r>
-            <a:r>
-              <a:rPr lang="pt-BR" b="1" dirty="0">
-                <a:latin typeface="Times New Roman" panose="02020603050405020304" pitchFamily="18" charset="0"/>
-                <a:cs typeface="Times New Roman" panose="02020603050405020304" pitchFamily="18" charset="0"/>
-              </a:rPr>
-              <a:t>PHP</a:t>
-            </a:r>
-          </a:p>
-          <a:p>
-            <a:pPr marL="0" indent="0" algn="just">
-              <a:buNone/>
-            </a:pPr>
-            <a:r>
-              <a:rPr lang="pt-BR" dirty="0">
-                <a:latin typeface="Times New Roman" panose="02020603050405020304" pitchFamily="18" charset="0"/>
-                <a:cs typeface="Times New Roman" panose="02020603050405020304" pitchFamily="18" charset="0"/>
-              </a:rPr>
-              <a:t>	</a:t>
-            </a:r>
-            <a:r>
-              <a:rPr lang="pt-BR" b="1" dirty="0">
-                <a:solidFill>
-                  <a:srgbClr val="FF0000"/>
-                </a:solidFill>
-                <a:latin typeface="Times New Roman" panose="02020603050405020304" pitchFamily="18" charset="0"/>
-                <a:cs typeface="Times New Roman" panose="02020603050405020304" pitchFamily="18" charset="0"/>
-              </a:rPr>
-              <a:t>Desafio em Sala de Aula</a:t>
-            </a:r>
-            <a:r>
-              <a:rPr lang="pt-BR" dirty="0">
-                <a:latin typeface="Times New Roman" panose="02020603050405020304" pitchFamily="18" charset="0"/>
-                <a:cs typeface="Times New Roman" panose="02020603050405020304" pitchFamily="18" charset="0"/>
-              </a:rPr>
-              <a:t>.</a:t>
-            </a:r>
-          </a:p>
-          <a:p>
-            <a:pPr marL="0" indent="0" algn="just">
-              <a:buNone/>
-            </a:pPr>
-            <a:r>
-              <a:rPr lang="pt-BR" dirty="0">
-                <a:latin typeface="Times New Roman" panose="02020603050405020304" pitchFamily="18" charset="0"/>
-                <a:cs typeface="Times New Roman" panose="02020603050405020304" pitchFamily="18" charset="0"/>
-              </a:rPr>
-              <a:t>		</a:t>
-            </a:r>
-          </a:p>
-          <a:p>
-            <a:pPr marL="0" indent="0" algn="just">
-              <a:buNone/>
-            </a:pPr>
-            <a:r>
-              <a:rPr lang="es-ES" dirty="0">
-                <a:latin typeface="Times New Roman" panose="02020603050405020304" pitchFamily="18" charset="0"/>
-                <a:cs typeface="Times New Roman" panose="02020603050405020304" pitchFamily="18" charset="0"/>
-              </a:rPr>
-              <a:t>- </a:t>
-            </a:r>
-            <a:r>
-              <a:rPr lang="es-ES" b="1" dirty="0">
-                <a:latin typeface="Times New Roman" panose="02020603050405020304" pitchFamily="18" charset="0"/>
-                <a:cs typeface="Times New Roman" panose="02020603050405020304" pitchFamily="18" charset="0"/>
-              </a:rPr>
-              <a:t>Quiz</a:t>
-            </a:r>
-            <a:r>
-              <a:rPr lang="es-ES" dirty="0">
-                <a:latin typeface="Times New Roman" panose="02020603050405020304" pitchFamily="18" charset="0"/>
-                <a:cs typeface="Times New Roman" panose="02020603050405020304" pitchFamily="18" charset="0"/>
-              </a:rPr>
-              <a:t> PHP</a:t>
-            </a:r>
-          </a:p>
-          <a:p>
-            <a:pPr marL="0" indent="0" algn="just">
-              <a:buNone/>
-            </a:pPr>
-            <a:r>
-              <a:rPr lang="es-ES" dirty="0">
-                <a:latin typeface="Times New Roman" panose="02020603050405020304" pitchFamily="18" charset="0"/>
-                <a:cs typeface="Times New Roman" panose="02020603050405020304" pitchFamily="18" charset="0"/>
-                <a:hlinkClick r:id="rId3"/>
-              </a:rPr>
-              <a:t>https://www.w3schools.com/php/php_quiz.asp</a:t>
-            </a:r>
-            <a:endParaRPr lang="es-ES" dirty="0">
+            <a:pPr marL="0" indent="0" algn="just">
+              <a:buNone/>
+            </a:pPr>
+            <a:endParaRPr lang="pt-BR" sz="2400" dirty="0">
               <a:latin typeface="Times New Roman" panose="02020603050405020304" pitchFamily="18" charset="0"/>
               <a:cs typeface="Times New Roman" panose="02020603050405020304" pitchFamily="18" charset="0"/>
             </a:endParaRPr>
@@ -44820,8 +45726,168 @@
             <a:pPr marL="0" indent="0" algn="just">
               <a:buNone/>
             </a:pPr>
-            <a:endParaRPr lang="pt-BR" dirty="0">
-              <a:latin typeface="Calibri" panose="020F0502020204030204" pitchFamily="34" charset="0"/>
+            <a:r>
+              <a:rPr lang="pt-BR" sz="2400" dirty="0">
+                <a:latin typeface="Times New Roman" panose="02020603050405020304" pitchFamily="18" charset="0"/>
+                <a:cs typeface="Times New Roman" panose="02020603050405020304" pitchFamily="18" charset="0"/>
+              </a:rPr>
+              <a:t>[1] Construindo classes no PHP orientado a objetos</a:t>
+            </a:r>
+          </a:p>
+          <a:p>
+            <a:pPr marL="0" indent="0" algn="just">
+              <a:buNone/>
+            </a:pPr>
+            <a:r>
+              <a:rPr lang="pt-BR" sz="2400" dirty="0">
+                <a:latin typeface="Times New Roman" panose="02020603050405020304" pitchFamily="18" charset="0"/>
+                <a:cs typeface="Times New Roman" panose="02020603050405020304" pitchFamily="18" charset="0"/>
+              </a:rPr>
+              <a:t>	</a:t>
+            </a:r>
+            <a:r>
+              <a:rPr lang="pt-BR" sz="2400" dirty="0">
+                <a:latin typeface="Times New Roman" panose="02020603050405020304" pitchFamily="18" charset="0"/>
+                <a:cs typeface="Times New Roman" panose="02020603050405020304" pitchFamily="18" charset="0"/>
+                <a:hlinkClick r:id="rId3"/>
+              </a:rPr>
+              <a:t>https://www.youtube.com/watch?v=xoH1WDI9l0I</a:t>
+            </a:r>
+            <a:endParaRPr lang="pt-BR" sz="2400" dirty="0">
+              <a:latin typeface="Times New Roman" panose="02020603050405020304" pitchFamily="18" charset="0"/>
+              <a:cs typeface="Times New Roman" panose="02020603050405020304" pitchFamily="18" charset="0"/>
+            </a:endParaRPr>
+          </a:p>
+          <a:p>
+            <a:pPr marL="0" indent="0" algn="just">
+              <a:buNone/>
+            </a:pPr>
+            <a:endParaRPr lang="pt-BR" sz="2400" dirty="0">
+              <a:latin typeface="Times New Roman" panose="02020603050405020304" pitchFamily="18" charset="0"/>
+              <a:cs typeface="Times New Roman" panose="02020603050405020304" pitchFamily="18" charset="0"/>
+            </a:endParaRPr>
+          </a:p>
+          <a:p>
+            <a:pPr marL="0" indent="0" algn="just">
+              <a:buNone/>
+            </a:pPr>
+            <a:r>
+              <a:rPr lang="pt-BR" sz="2400" dirty="0">
+                <a:latin typeface="Times New Roman" panose="02020603050405020304" pitchFamily="18" charset="0"/>
+                <a:cs typeface="Times New Roman" panose="02020603050405020304" pitchFamily="18" charset="0"/>
+              </a:rPr>
+              <a:t>[2] </a:t>
+            </a:r>
+            <a:r>
+              <a:rPr lang="pt-BR" sz="2400" dirty="0" err="1">
+                <a:latin typeface="Times New Roman" panose="02020603050405020304" pitchFamily="18" charset="0"/>
+                <a:cs typeface="Times New Roman" panose="02020603050405020304" pitchFamily="18" charset="0"/>
+              </a:rPr>
+              <a:t>Creating</a:t>
+            </a:r>
+            <a:r>
+              <a:rPr lang="pt-BR" sz="2400" dirty="0">
+                <a:latin typeface="Times New Roman" panose="02020603050405020304" pitchFamily="18" charset="0"/>
+                <a:cs typeface="Times New Roman" panose="02020603050405020304" pitchFamily="18" charset="0"/>
+              </a:rPr>
+              <a:t> classes, </a:t>
+            </a:r>
+            <a:r>
+              <a:rPr lang="pt-BR" sz="2400" dirty="0" err="1">
+                <a:latin typeface="Times New Roman" panose="02020603050405020304" pitchFamily="18" charset="0"/>
+                <a:cs typeface="Times New Roman" panose="02020603050405020304" pitchFamily="18" charset="0"/>
+              </a:rPr>
+              <a:t>properties</a:t>
+            </a:r>
+            <a:r>
+              <a:rPr lang="pt-BR" sz="2400" dirty="0">
+                <a:latin typeface="Times New Roman" panose="02020603050405020304" pitchFamily="18" charset="0"/>
+                <a:cs typeface="Times New Roman" panose="02020603050405020304" pitchFamily="18" charset="0"/>
+              </a:rPr>
+              <a:t>, </a:t>
+            </a:r>
+            <a:r>
+              <a:rPr lang="pt-BR" sz="2400" dirty="0" err="1">
+                <a:latin typeface="Times New Roman" panose="02020603050405020304" pitchFamily="18" charset="0"/>
+                <a:cs typeface="Times New Roman" panose="02020603050405020304" pitchFamily="18" charset="0"/>
+              </a:rPr>
+              <a:t>methods</a:t>
+            </a:r>
+            <a:r>
+              <a:rPr lang="pt-BR" sz="2400" dirty="0">
+                <a:latin typeface="Times New Roman" panose="02020603050405020304" pitchFamily="18" charset="0"/>
+                <a:cs typeface="Times New Roman" panose="02020603050405020304" pitchFamily="18" charset="0"/>
+              </a:rPr>
+              <a:t> - OOP in PHP – Part 1</a:t>
+            </a:r>
+          </a:p>
+          <a:p>
+            <a:pPr marL="0" indent="0" algn="just">
+              <a:buNone/>
+            </a:pPr>
+            <a:r>
+              <a:rPr lang="pt-BR" sz="2400" dirty="0">
+                <a:latin typeface="Times New Roman" panose="02020603050405020304" pitchFamily="18" charset="0"/>
+                <a:cs typeface="Times New Roman" panose="02020603050405020304" pitchFamily="18" charset="0"/>
+              </a:rPr>
+              <a:t>	</a:t>
+            </a:r>
+            <a:r>
+              <a:rPr lang="pt-BR" sz="2400" dirty="0">
+                <a:latin typeface="Times New Roman" panose="02020603050405020304" pitchFamily="18" charset="0"/>
+                <a:cs typeface="Times New Roman" panose="02020603050405020304" pitchFamily="18" charset="0"/>
+                <a:hlinkClick r:id="rId4"/>
+              </a:rPr>
+              <a:t>https://www.youtube.com/watch?v=4xvCT7UPY3k</a:t>
+            </a:r>
+            <a:endParaRPr lang="pt-BR" sz="2400" dirty="0">
+              <a:latin typeface="Times New Roman" panose="02020603050405020304" pitchFamily="18" charset="0"/>
+              <a:cs typeface="Times New Roman" panose="02020603050405020304" pitchFamily="18" charset="0"/>
+            </a:endParaRPr>
+          </a:p>
+          <a:p>
+            <a:pPr marL="0" indent="0" algn="just">
+              <a:buNone/>
+            </a:pPr>
+            <a:endParaRPr lang="pt-BR" sz="2400" dirty="0">
+              <a:latin typeface="Times New Roman" panose="02020603050405020304" pitchFamily="18" charset="0"/>
+              <a:cs typeface="Times New Roman" panose="02020603050405020304" pitchFamily="18" charset="0"/>
+            </a:endParaRPr>
+          </a:p>
+          <a:p>
+            <a:pPr marL="0" indent="0" algn="just">
+              <a:buNone/>
+            </a:pPr>
+            <a:endParaRPr lang="pt-BR" sz="2400" dirty="0">
+              <a:latin typeface="Times New Roman" panose="02020603050405020304" pitchFamily="18" charset="0"/>
+              <a:cs typeface="Times New Roman" panose="02020603050405020304" pitchFamily="18" charset="0"/>
+            </a:endParaRPr>
+          </a:p>
+          <a:p>
+            <a:pPr marL="0" indent="0" algn="just">
+              <a:buNone/>
+            </a:pPr>
+            <a:endParaRPr lang="pt-BR" sz="2400" dirty="0">
+              <a:latin typeface="Times New Roman" panose="02020603050405020304" pitchFamily="18" charset="0"/>
+              <a:cs typeface="Times New Roman" panose="02020603050405020304" pitchFamily="18" charset="0"/>
+            </a:endParaRPr>
+          </a:p>
+          <a:p>
+            <a:pPr marL="0" indent="0" algn="just">
+              <a:buNone/>
+            </a:pPr>
+            <a:endParaRPr lang="pt-BR" sz="2400" dirty="0">
+              <a:latin typeface="Times New Roman" panose="02020603050405020304" pitchFamily="18" charset="0"/>
+              <a:cs typeface="Times New Roman" panose="02020603050405020304" pitchFamily="18" charset="0"/>
+            </a:endParaRPr>
+          </a:p>
+          <a:p>
+            <a:pPr marL="0" indent="0" algn="just">
+              <a:buNone/>
+            </a:pPr>
+            <a:endParaRPr lang="pt-BR" sz="2400" dirty="0">
+              <a:latin typeface="Times New Roman" panose="02020603050405020304" pitchFamily="18" charset="0"/>
+              <a:cs typeface="Times New Roman" panose="02020603050405020304" pitchFamily="18" charset="0"/>
             </a:endParaRPr>
           </a:p>
         </p:txBody>
@@ -44829,7 +45895,7 @@
     </p:spTree>
     <p:extLst>
       <p:ext uri="{BB962C8B-B14F-4D97-AF65-F5344CB8AC3E}">
-        <p14:creationId xmlns:p14="http://schemas.microsoft.com/office/powerpoint/2010/main" val="2470652989"/>
+        <p14:creationId xmlns:p14="http://schemas.microsoft.com/office/powerpoint/2010/main" val="2747596967"/>
       </p:ext>
     </p:extLst>
   </p:cSld>
@@ -44885,6 +45951,226 @@
                   <a:srgbClr val="0070C0"/>
                 </a:solidFill>
               </a:rPr>
+              <a:t>Dinâmica</a:t>
+            </a:r>
+            <a:r>
+              <a:rPr lang="en-US" b="1" dirty="0">
+                <a:solidFill>
+                  <a:srgbClr val="0070C0"/>
+                </a:solidFill>
+              </a:rPr>
+              <a:t>/</a:t>
+            </a:r>
+            <a:r>
+              <a:rPr lang="en-US" b="1" dirty="0" err="1">
+                <a:solidFill>
+                  <a:srgbClr val="0070C0"/>
+                </a:solidFill>
+              </a:rPr>
+              <a:t>Atividades</a:t>
+            </a:r>
+            <a:endParaRPr lang="en-US" b="1" dirty="0">
+              <a:solidFill>
+                <a:srgbClr val="0070C0"/>
+              </a:solidFill>
+            </a:endParaRPr>
+          </a:p>
+        </p:txBody>
+      </p:sp>
+      <p:sp>
+        <p:nvSpPr>
+          <p:cNvPr id="8" name="Text Placeholder 2"/>
+          <p:cNvSpPr>
+            <a:spLocks noGrp="1"/>
+          </p:cNvSpPr>
+          <p:nvPr>
+            <p:ph type="body" sz="half" idx="1"/>
+          </p:nvPr>
+        </p:nvSpPr>
+        <p:spPr>
+          <a:xfrm>
+            <a:off x="139472" y="1063230"/>
+            <a:ext cx="8865056" cy="3606305"/>
+          </a:xfrm>
+        </p:spPr>
+        <p:txBody>
+          <a:bodyPr>
+            <a:noAutofit/>
+          </a:bodyPr>
+          <a:lstStyle/>
+          <a:p>
+            <a:pPr algn="just">
+              <a:buFontTx/>
+              <a:buChar char="-"/>
+            </a:pPr>
+            <a:r>
+              <a:rPr lang="pt-BR" dirty="0">
+                <a:latin typeface="Times New Roman" panose="02020603050405020304" pitchFamily="18" charset="0"/>
+                <a:cs typeface="Times New Roman" panose="02020603050405020304" pitchFamily="18" charset="0"/>
+              </a:rPr>
+              <a:t>Exercícios de Fixação </a:t>
+            </a:r>
+            <a:r>
+              <a:rPr lang="pt-BR" b="1" dirty="0">
+                <a:latin typeface="Times New Roman" panose="02020603050405020304" pitchFamily="18" charset="0"/>
+                <a:cs typeface="Times New Roman" panose="02020603050405020304" pitchFamily="18" charset="0"/>
+              </a:rPr>
+              <a:t>PHP</a:t>
+            </a:r>
+          </a:p>
+          <a:p>
+            <a:pPr marL="0" indent="0" algn="just">
+              <a:buNone/>
+            </a:pPr>
+            <a:r>
+              <a:rPr lang="pt-BR" dirty="0">
+                <a:latin typeface="Times New Roman" panose="02020603050405020304" pitchFamily="18" charset="0"/>
+                <a:cs typeface="Times New Roman" panose="02020603050405020304" pitchFamily="18" charset="0"/>
+              </a:rPr>
+              <a:t>	</a:t>
+            </a:r>
+            <a:r>
+              <a:rPr lang="pt-BR" b="1" dirty="0">
+                <a:solidFill>
+                  <a:srgbClr val="FF0000"/>
+                </a:solidFill>
+                <a:latin typeface="Times New Roman" panose="02020603050405020304" pitchFamily="18" charset="0"/>
+                <a:cs typeface="Times New Roman" panose="02020603050405020304" pitchFamily="18" charset="0"/>
+              </a:rPr>
+              <a:t>Desafio em Sala de Aula</a:t>
+            </a:r>
+            <a:r>
+              <a:rPr lang="pt-BR" dirty="0">
+                <a:latin typeface="Times New Roman" panose="02020603050405020304" pitchFamily="18" charset="0"/>
+                <a:cs typeface="Times New Roman" panose="02020603050405020304" pitchFamily="18" charset="0"/>
+              </a:rPr>
+              <a:t>.</a:t>
+            </a:r>
+          </a:p>
+          <a:p>
+            <a:pPr marL="0" indent="0" algn="just">
+              <a:buNone/>
+            </a:pPr>
+            <a:r>
+              <a:rPr lang="pt-BR" dirty="0">
+                <a:latin typeface="Times New Roman" panose="02020603050405020304" pitchFamily="18" charset="0"/>
+                <a:cs typeface="Times New Roman" panose="02020603050405020304" pitchFamily="18" charset="0"/>
+              </a:rPr>
+              <a:t>		</a:t>
+            </a:r>
+          </a:p>
+          <a:p>
+            <a:pPr marL="0" indent="0" algn="just">
+              <a:buNone/>
+            </a:pPr>
+            <a:r>
+              <a:rPr lang="es-ES" dirty="0">
+                <a:latin typeface="Times New Roman" panose="02020603050405020304" pitchFamily="18" charset="0"/>
+                <a:cs typeface="Times New Roman" panose="02020603050405020304" pitchFamily="18" charset="0"/>
+              </a:rPr>
+              <a:t>- </a:t>
+            </a:r>
+            <a:r>
+              <a:rPr lang="es-ES" b="1" dirty="0">
+                <a:latin typeface="Times New Roman" panose="02020603050405020304" pitchFamily="18" charset="0"/>
+                <a:cs typeface="Times New Roman" panose="02020603050405020304" pitchFamily="18" charset="0"/>
+              </a:rPr>
+              <a:t>Quiz</a:t>
+            </a:r>
+            <a:r>
+              <a:rPr lang="es-ES" dirty="0">
+                <a:latin typeface="Times New Roman" panose="02020603050405020304" pitchFamily="18" charset="0"/>
+                <a:cs typeface="Times New Roman" panose="02020603050405020304" pitchFamily="18" charset="0"/>
+              </a:rPr>
+              <a:t> PHP</a:t>
+            </a:r>
+          </a:p>
+          <a:p>
+            <a:pPr marL="0" indent="0" algn="just">
+              <a:buNone/>
+            </a:pPr>
+            <a:r>
+              <a:rPr lang="es-ES" dirty="0">
+                <a:latin typeface="Times New Roman" panose="02020603050405020304" pitchFamily="18" charset="0"/>
+                <a:cs typeface="Times New Roman" panose="02020603050405020304" pitchFamily="18" charset="0"/>
+                <a:hlinkClick r:id="rId3"/>
+              </a:rPr>
+              <a:t>https://www.w3schools.com/php/php_quiz.asp</a:t>
+            </a:r>
+            <a:endParaRPr lang="es-ES" dirty="0">
+              <a:latin typeface="Times New Roman" panose="02020603050405020304" pitchFamily="18" charset="0"/>
+              <a:cs typeface="Times New Roman" panose="02020603050405020304" pitchFamily="18" charset="0"/>
+            </a:endParaRPr>
+          </a:p>
+          <a:p>
+            <a:pPr marL="0" indent="0" algn="just">
+              <a:buNone/>
+            </a:pPr>
+            <a:endParaRPr lang="pt-BR" dirty="0">
+              <a:latin typeface="Calibri" panose="020F0502020204030204" pitchFamily="34" charset="0"/>
+            </a:endParaRPr>
+          </a:p>
+        </p:txBody>
+      </p:sp>
+    </p:spTree>
+    <p:extLst>
+      <p:ext uri="{BB962C8B-B14F-4D97-AF65-F5344CB8AC3E}">
+        <p14:creationId xmlns:p14="http://schemas.microsoft.com/office/powerpoint/2010/main" val="2470652989"/>
+      </p:ext>
+    </p:extLst>
+  </p:cSld>
+  <p:clrMapOvr>
+    <a:masterClrMapping/>
+  </p:clrMapOvr>
+  <p:transition spd="med"/>
+</p:sld>
+</file>
+
+<file path=ppt/slides/slide75.xml><?xml version="1.0" encoding="utf-8"?>
+<p:sld xmlns:a="http://schemas.openxmlformats.org/drawingml/2006/main" xmlns:r="http://schemas.openxmlformats.org/officeDocument/2006/relationships" xmlns:p="http://schemas.openxmlformats.org/presentationml/2006/main">
+  <p:cSld>
+    <p:spTree>
+      <p:nvGrpSpPr>
+        <p:cNvPr id="1" name=""/>
+        <p:cNvGrpSpPr/>
+        <p:nvPr/>
+      </p:nvGrpSpPr>
+      <p:grpSpPr>
+        <a:xfrm>
+          <a:off x="0" y="0"/>
+          <a:ext cx="0" cy="0"/>
+          <a:chOff x="0" y="0"/>
+          <a:chExt cx="0" cy="0"/>
+        </a:xfrm>
+      </p:grpSpPr>
+      <p:sp>
+        <p:nvSpPr>
+          <p:cNvPr id="6" name="Title 1"/>
+          <p:cNvSpPr>
+            <a:spLocks noGrp="1"/>
+          </p:cNvSpPr>
+          <p:nvPr>
+            <p:ph type="title"/>
+          </p:nvPr>
+        </p:nvSpPr>
+        <p:spPr>
+          <a:xfrm>
+            <a:off x="457200" y="205980"/>
+            <a:ext cx="8229600" cy="857251"/>
+          </a:xfrm>
+        </p:spPr>
+        <p:txBody>
+          <a:bodyPr>
+            <a:normAutofit/>
+          </a:bodyPr>
+          <a:lstStyle/>
+          <a:p>
+            <a:r>
+              <a:rPr lang="en-US" b="1" dirty="0" err="1">
+                <a:solidFill>
+                  <a:srgbClr val="0070C0"/>
+                </a:solidFill>
+              </a:rPr>
               <a:t>Referências</a:t>
             </a:r>
             <a:r>
@@ -45230,7 +46516,7 @@
 </p:sld>
 </file>
 
-<file path=ppt/slides/slide75.xml><?xml version="1.0" encoding="utf-8"?>
+<file path=ppt/slides/slide76.xml><?xml version="1.0" encoding="utf-8"?>
 <p:sld xmlns:a="http://schemas.openxmlformats.org/drawingml/2006/main" xmlns:r="http://schemas.openxmlformats.org/officeDocument/2006/relationships" xmlns:p="http://schemas.openxmlformats.org/presentationml/2006/main">
   <p:cSld>
     <p:spTree>

</xml_diff>